<commit_message>
add rapport + slide nam
</commit_message>
<xml_diff>
--- a/RapportNam/Nouveau Microsoft PowerPoint Presentation.pptx
+++ b/RapportNam/Nouveau Microsoft PowerPoint Presentation.pptx
@@ -5,19 +5,22 @@
     <p:sldMasterId id="2147483648" r:id="rId1"/>
   </p:sldMasterIdLst>
   <p:notesMasterIdLst>
-    <p:notesMasterId r:id="rId12"/>
+    <p:notesMasterId r:id="rId15"/>
   </p:notesMasterIdLst>
   <p:sldIdLst>
-    <p:sldId id="256" r:id="rId2"/>
-    <p:sldId id="263" r:id="rId3"/>
-    <p:sldId id="264" r:id="rId4"/>
-    <p:sldId id="265" r:id="rId5"/>
-    <p:sldId id="257" r:id="rId6"/>
-    <p:sldId id="258" r:id="rId7"/>
-    <p:sldId id="259" r:id="rId8"/>
-    <p:sldId id="260" r:id="rId9"/>
-    <p:sldId id="261" r:id="rId10"/>
-    <p:sldId id="262" r:id="rId11"/>
+    <p:sldId id="266" r:id="rId2"/>
+    <p:sldId id="268" r:id="rId3"/>
+    <p:sldId id="267" r:id="rId4"/>
+    <p:sldId id="269" r:id="rId5"/>
+    <p:sldId id="256" r:id="rId6"/>
+    <p:sldId id="263" r:id="rId7"/>
+    <p:sldId id="264" r:id="rId8"/>
+    <p:sldId id="257" r:id="rId9"/>
+    <p:sldId id="258" r:id="rId10"/>
+    <p:sldId id="259" r:id="rId11"/>
+    <p:sldId id="260" r:id="rId12"/>
+    <p:sldId id="261" r:id="rId13"/>
+    <p:sldId id="262" r:id="rId14"/>
   </p:sldIdLst>
   <p:sldSz cx="12192000" cy="6858000"/>
   <p:notesSz cx="6858000" cy="9144000"/>
@@ -210,7 +213,7 @@
           <a:p>
             <a:fld id="{F1599EA0-2EDB-4DB3-9448-6B6199578CD9}" type="datetimeFigureOut">
               <a:rPr lang="fr-FR" smtClean="0"/>
-              <a:t>24/05/2018</a:t>
+              <a:t>29/05/2018</a:t>
             </a:fld>
             <a:endParaRPr lang="fr-FR"/>
           </a:p>
@@ -543,7 +546,7 @@
           <a:p>
             <a:fld id="{A8020623-720D-444E-873F-5CF6465445A4}" type="slidenum">
               <a:rPr lang="fr-FR" smtClean="0"/>
-              <a:t>1</a:t>
+              <a:t>5</a:t>
             </a:fld>
             <a:endParaRPr lang="fr-FR"/>
           </a:p>
@@ -553,6 +556,90 @@
     <p:extLst>
       <p:ext uri="{BB962C8B-B14F-4D97-AF65-F5344CB8AC3E}">
         <p14:creationId xmlns:p14="http://schemas.microsoft.com/office/powerpoint/2010/main" val="2167838526"/>
+      </p:ext>
+    </p:extLst>
+  </p:cSld>
+  <p:clrMapOvr>
+    <a:masterClrMapping/>
+  </p:clrMapOvr>
+</p:notes>
+</file>
+
+<file path=ppt/notesSlides/notesSlide2.xml><?xml version="1.0" encoding="utf-8"?>
+<p:notes xmlns:a="http://schemas.openxmlformats.org/drawingml/2006/main" xmlns:r="http://schemas.openxmlformats.org/officeDocument/2006/relationships" xmlns:p="http://schemas.openxmlformats.org/presentationml/2006/main">
+  <p:cSld>
+    <p:spTree>
+      <p:nvGrpSpPr>
+        <p:cNvPr id="1" name=""/>
+        <p:cNvGrpSpPr/>
+        <p:nvPr/>
+      </p:nvGrpSpPr>
+      <p:grpSpPr>
+        <a:xfrm>
+          <a:off x="0" y="0"/>
+          <a:ext cx="0" cy="0"/>
+          <a:chOff x="0" y="0"/>
+          <a:chExt cx="0" cy="0"/>
+        </a:xfrm>
+      </p:grpSpPr>
+      <p:sp>
+        <p:nvSpPr>
+          <p:cNvPr id="2" name="Slide Image Placeholder 1"/>
+          <p:cNvSpPr>
+            <a:spLocks noGrp="1" noRot="1" noChangeAspect="1"/>
+          </p:cNvSpPr>
+          <p:nvPr>
+            <p:ph type="sldImg"/>
+          </p:nvPr>
+        </p:nvSpPr>
+        <p:spPr/>
+      </p:sp>
+      <p:sp>
+        <p:nvSpPr>
+          <p:cNvPr id="3" name="Notes Placeholder 2"/>
+          <p:cNvSpPr>
+            <a:spLocks noGrp="1"/>
+          </p:cNvSpPr>
+          <p:nvPr>
+            <p:ph type="body" idx="1"/>
+          </p:nvPr>
+        </p:nvSpPr>
+        <p:spPr/>
+        <p:txBody>
+          <a:bodyPr/>
+          <a:lstStyle/>
+          <a:p>
+            <a:endParaRPr lang="fr-FR" dirty="0"/>
+          </a:p>
+        </p:txBody>
+      </p:sp>
+      <p:sp>
+        <p:nvSpPr>
+          <p:cNvPr id="4" name="Slide Number Placeholder 3"/>
+          <p:cNvSpPr>
+            <a:spLocks noGrp="1"/>
+          </p:cNvSpPr>
+          <p:nvPr>
+            <p:ph type="sldNum" sz="quarter" idx="10"/>
+          </p:nvPr>
+        </p:nvSpPr>
+        <p:spPr/>
+        <p:txBody>
+          <a:bodyPr/>
+          <a:lstStyle/>
+          <a:p>
+            <a:fld id="{A8020623-720D-444E-873F-5CF6465445A4}" type="slidenum">
+              <a:rPr lang="fr-FR" smtClean="0"/>
+              <a:t>11</a:t>
+            </a:fld>
+            <a:endParaRPr lang="fr-FR"/>
+          </a:p>
+        </p:txBody>
+      </p:sp>
+    </p:spTree>
+    <p:extLst>
+      <p:ext uri="{BB962C8B-B14F-4D97-AF65-F5344CB8AC3E}">
+        <p14:creationId xmlns:p14="http://schemas.microsoft.com/office/powerpoint/2010/main" val="1100509724"/>
       </p:ext>
     </p:extLst>
   </p:cSld>
@@ -711,7 +798,7 @@
           <a:p>
             <a:fld id="{0AEE68E7-8F63-4CB9-9C80-D7784EE8CFAB}" type="datetimeFigureOut">
               <a:rPr lang="fr-FR" smtClean="0"/>
-              <a:t>24/05/2018</a:t>
+              <a:t>29/05/2018</a:t>
             </a:fld>
             <a:endParaRPr lang="fr-FR"/>
           </a:p>
@@ -911,7 +998,7 @@
           <a:p>
             <a:fld id="{0AEE68E7-8F63-4CB9-9C80-D7784EE8CFAB}" type="datetimeFigureOut">
               <a:rPr lang="fr-FR" smtClean="0"/>
-              <a:t>24/05/2018</a:t>
+              <a:t>29/05/2018</a:t>
             </a:fld>
             <a:endParaRPr lang="fr-FR"/>
           </a:p>
@@ -1121,7 +1208,7 @@
           <a:p>
             <a:fld id="{0AEE68E7-8F63-4CB9-9C80-D7784EE8CFAB}" type="datetimeFigureOut">
               <a:rPr lang="fr-FR" smtClean="0"/>
-              <a:t>24/05/2018</a:t>
+              <a:t>29/05/2018</a:t>
             </a:fld>
             <a:endParaRPr lang="fr-FR"/>
           </a:p>
@@ -1321,7 +1408,7 @@
           <a:p>
             <a:fld id="{0AEE68E7-8F63-4CB9-9C80-D7784EE8CFAB}" type="datetimeFigureOut">
               <a:rPr lang="fr-FR" smtClean="0"/>
-              <a:t>24/05/2018</a:t>
+              <a:t>29/05/2018</a:t>
             </a:fld>
             <a:endParaRPr lang="fr-FR"/>
           </a:p>
@@ -1597,7 +1684,7 @@
           <a:p>
             <a:fld id="{0AEE68E7-8F63-4CB9-9C80-D7784EE8CFAB}" type="datetimeFigureOut">
               <a:rPr lang="fr-FR" smtClean="0"/>
-              <a:t>24/05/2018</a:t>
+              <a:t>29/05/2018</a:t>
             </a:fld>
             <a:endParaRPr lang="fr-FR"/>
           </a:p>
@@ -1865,7 +1952,7 @@
           <a:p>
             <a:fld id="{0AEE68E7-8F63-4CB9-9C80-D7784EE8CFAB}" type="datetimeFigureOut">
               <a:rPr lang="fr-FR" smtClean="0"/>
-              <a:t>24/05/2018</a:t>
+              <a:t>29/05/2018</a:t>
             </a:fld>
             <a:endParaRPr lang="fr-FR"/>
           </a:p>
@@ -2280,7 +2367,7 @@
           <a:p>
             <a:fld id="{0AEE68E7-8F63-4CB9-9C80-D7784EE8CFAB}" type="datetimeFigureOut">
               <a:rPr lang="fr-FR" smtClean="0"/>
-              <a:t>24/05/2018</a:t>
+              <a:t>29/05/2018</a:t>
             </a:fld>
             <a:endParaRPr lang="fr-FR"/>
           </a:p>
@@ -2422,7 +2509,7 @@
           <a:p>
             <a:fld id="{0AEE68E7-8F63-4CB9-9C80-D7784EE8CFAB}" type="datetimeFigureOut">
               <a:rPr lang="fr-FR" smtClean="0"/>
-              <a:t>24/05/2018</a:t>
+              <a:t>29/05/2018</a:t>
             </a:fld>
             <a:endParaRPr lang="fr-FR"/>
           </a:p>
@@ -2535,7 +2622,7 @@
           <a:p>
             <a:fld id="{0AEE68E7-8F63-4CB9-9C80-D7784EE8CFAB}" type="datetimeFigureOut">
               <a:rPr lang="fr-FR" smtClean="0"/>
-              <a:t>24/05/2018</a:t>
+              <a:t>29/05/2018</a:t>
             </a:fld>
             <a:endParaRPr lang="fr-FR"/>
           </a:p>
@@ -2848,7 +2935,7 @@
           <a:p>
             <a:fld id="{0AEE68E7-8F63-4CB9-9C80-D7784EE8CFAB}" type="datetimeFigureOut">
               <a:rPr lang="fr-FR" smtClean="0"/>
-              <a:t>24/05/2018</a:t>
+              <a:t>29/05/2018</a:t>
             </a:fld>
             <a:endParaRPr lang="fr-FR"/>
           </a:p>
@@ -3137,7 +3224,7 @@
           <a:p>
             <a:fld id="{0AEE68E7-8F63-4CB9-9C80-D7784EE8CFAB}" type="datetimeFigureOut">
               <a:rPr lang="fr-FR" smtClean="0"/>
-              <a:t>24/05/2018</a:t>
+              <a:t>29/05/2018</a:t>
             </a:fld>
             <a:endParaRPr lang="fr-FR"/>
           </a:p>
@@ -3380,7 +3467,7 @@
           <a:p>
             <a:fld id="{0AEE68E7-8F63-4CB9-9C80-D7784EE8CFAB}" type="datetimeFigureOut">
               <a:rPr lang="fr-FR" smtClean="0"/>
-              <a:t>24/05/2018</a:t>
+              <a:t>29/05/2018</a:t>
             </a:fld>
             <a:endParaRPr lang="fr-FR"/>
           </a:p>
@@ -3799,69 +3886,174 @@
       </p:grpSpPr>
       <p:sp>
         <p:nvSpPr>
-          <p:cNvPr id="2" name="Title 1">
-            <a:extLst>
-              <a:ext uri="{FF2B5EF4-FFF2-40B4-BE49-F238E27FC236}">
-                <a16:creationId xmlns:a16="http://schemas.microsoft.com/office/drawing/2014/main" id="{098EB305-D5AF-4CDE-8F84-7DB4398C3831}"/>
-              </a:ext>
-            </a:extLst>
-          </p:cNvPr>
-          <p:cNvSpPr>
-            <a:spLocks noGrp="1"/>
-          </p:cNvSpPr>
-          <p:nvPr>
-            <p:ph type="ctrTitle"/>
-          </p:nvPr>
-        </p:nvSpPr>
-        <p:spPr/>
-        <p:txBody>
-          <a:bodyPr/>
-          <a:lstStyle/>
-          <a:p>
-            <a:r>
-              <a:rPr lang="fr-FR" dirty="0" err="1">
+          <p:cNvPr id="3" name="Content Placeholder 2">
+            <a:extLst>
+              <a:ext uri="{FF2B5EF4-FFF2-40B4-BE49-F238E27FC236}">
+                <a16:creationId xmlns:a16="http://schemas.microsoft.com/office/drawing/2014/main" id="{1CBCE3FF-CB34-4A80-B0E7-4BBB30B90954}"/>
+              </a:ext>
+            </a:extLst>
+          </p:cNvPr>
+          <p:cNvSpPr>
+            <a:spLocks noGrp="1"/>
+          </p:cNvSpPr>
+          <p:nvPr>
+            <p:ph idx="1"/>
+          </p:nvPr>
+        </p:nvSpPr>
+        <p:spPr>
+          <a:xfrm>
+            <a:off x="866335" y="2191385"/>
+            <a:ext cx="10515600" cy="1635027"/>
+          </a:xfrm>
+        </p:spPr>
+        <p:txBody>
+          <a:bodyPr>
+            <a:normAutofit/>
+          </a:bodyPr>
+          <a:lstStyle/>
+          <a:p>
+            <a:pPr marL="0" indent="0" algn="ctr">
+              <a:buNone/>
+            </a:pPr>
+            <a:r>
+              <a:rPr lang="fr-FR" sz="4000" dirty="0">
                 <a:solidFill>
                   <a:srgbClr val="FF0000"/>
                 </a:solidFill>
               </a:rPr>
-              <a:t>linguistiC@SE</a:t>
-            </a:r>
-            <a:endParaRPr lang="fr-FR" dirty="0">
-              <a:solidFill>
-                <a:srgbClr val="FF0000"/>
-              </a:solidFill>
-            </a:endParaRPr>
-          </a:p>
-        </p:txBody>
-      </p:sp>
-      <p:sp>
-        <p:nvSpPr>
-          <p:cNvPr id="3" name="Subtitle 2">
-            <a:extLst>
-              <a:ext uri="{FF2B5EF4-FFF2-40B4-BE49-F238E27FC236}">
-                <a16:creationId xmlns:a16="http://schemas.microsoft.com/office/drawing/2014/main" id="{B6F05377-FAFD-4DAF-B1A2-3AC2AA1406F7}"/>
-              </a:ext>
-            </a:extLst>
-          </p:cNvPr>
-          <p:cNvSpPr>
-            <a:spLocks noGrp="1"/>
-          </p:cNvSpPr>
-          <p:nvPr>
-            <p:ph type="subTitle" idx="1"/>
-          </p:nvPr>
-        </p:nvSpPr>
-        <p:spPr/>
-        <p:txBody>
-          <a:bodyPr/>
-          <a:lstStyle/>
-          <a:p>
+              <a:t>Une infrastructure Web pour l'acquisition de cas de corrections de phrases en français.</a:t>
+            </a:r>
+            <a:endParaRPr lang="fr-FR" sz="4000" dirty="0"/>
+          </a:p>
+        </p:txBody>
+      </p:sp>
+      <p:sp>
+        <p:nvSpPr>
+          <p:cNvPr id="4" name="TextBox 3">
+            <a:extLst>
+              <a:ext uri="{FF2B5EF4-FFF2-40B4-BE49-F238E27FC236}">
+                <a16:creationId xmlns:a16="http://schemas.microsoft.com/office/drawing/2014/main" id="{2AA0F247-2A4C-44B8-B577-BDD2F858C39B}"/>
+              </a:ext>
+            </a:extLst>
+          </p:cNvPr>
+          <p:cNvSpPr txBox="1"/>
+          <p:nvPr/>
+        </p:nvSpPr>
+        <p:spPr>
+          <a:xfrm>
+            <a:off x="9566031" y="5641145"/>
+            <a:ext cx="2082018" cy="646331"/>
+          </a:xfrm>
+          <a:prstGeom prst="rect">
+            <a:avLst/>
+          </a:prstGeom>
+          <a:noFill/>
+        </p:spPr>
+        <p:txBody>
+          <a:bodyPr wrap="square" rtlCol="0">
+            <a:spAutoFit/>
+          </a:bodyPr>
+          <a:lstStyle/>
+          <a:p>
+            <a:pPr algn="ctr"/>
             <a:r>
               <a:rPr lang="en-US" dirty="0"/>
-              <a:t>Interface web et Base de </a:t>
-            </a:r>
+              <a:t>L3 INFO</a:t>
+            </a:r>
+          </a:p>
+          <a:p>
+            <a:pPr algn="ctr"/>
+            <a:r>
+              <a:rPr lang="fr-FR" dirty="0"/>
+              <a:t>Année</a:t>
+            </a:r>
+            <a:r>
+              <a:rPr lang="en-US" dirty="0"/>
+              <a:t> 2017-2018</a:t>
+            </a:r>
+            <a:endParaRPr lang="fr-FR" dirty="0"/>
+          </a:p>
+        </p:txBody>
+      </p:sp>
+      <p:sp>
+        <p:nvSpPr>
+          <p:cNvPr id="5" name="TextBox 4">
+            <a:extLst>
+              <a:ext uri="{FF2B5EF4-FFF2-40B4-BE49-F238E27FC236}">
+                <a16:creationId xmlns:a16="http://schemas.microsoft.com/office/drawing/2014/main" id="{02541F68-2122-44C8-B44A-48B77B8AC57C}"/>
+              </a:ext>
+            </a:extLst>
+          </p:cNvPr>
+          <p:cNvSpPr txBox="1"/>
+          <p:nvPr/>
+        </p:nvSpPr>
+        <p:spPr>
+          <a:xfrm>
+            <a:off x="9973993" y="5271813"/>
+            <a:ext cx="2039816" cy="369332"/>
+          </a:xfrm>
+          <a:prstGeom prst="rect">
+            <a:avLst/>
+          </a:prstGeom>
+          <a:noFill/>
+        </p:spPr>
+        <p:txBody>
+          <a:bodyPr wrap="square" rtlCol="0">
+            <a:spAutoFit/>
+          </a:bodyPr>
+          <a:lstStyle/>
+          <a:p>
+            <a:r>
+              <a:rPr lang="en-US" dirty="0"/>
+              <a:t>LY Hue Nam</a:t>
+            </a:r>
+            <a:endParaRPr lang="fr-FR" dirty="0"/>
+          </a:p>
+        </p:txBody>
+      </p:sp>
+      <p:sp>
+        <p:nvSpPr>
+          <p:cNvPr id="6" name="TextBox 5">
+            <a:extLst>
+              <a:ext uri="{FF2B5EF4-FFF2-40B4-BE49-F238E27FC236}">
+                <a16:creationId xmlns:a16="http://schemas.microsoft.com/office/drawing/2014/main" id="{D1523544-8720-4D0D-8D5F-6273D22E63AA}"/>
+              </a:ext>
+            </a:extLst>
+          </p:cNvPr>
+          <p:cNvSpPr txBox="1"/>
+          <p:nvPr/>
+        </p:nvSpPr>
+        <p:spPr>
+          <a:xfrm>
+            <a:off x="548640" y="5401994"/>
+            <a:ext cx="2644726" cy="646331"/>
+          </a:xfrm>
+          <a:prstGeom prst="rect">
+            <a:avLst/>
+          </a:prstGeom>
+          <a:noFill/>
+        </p:spPr>
+        <p:txBody>
+          <a:bodyPr wrap="square" rtlCol="0">
+            <a:spAutoFit/>
+          </a:bodyPr>
+          <a:lstStyle/>
+          <a:p>
+            <a:pPr algn="ctr"/>
             <a:r>
               <a:rPr lang="fr-FR" dirty="0" err="1"/>
-              <a:t>donnees</a:t>
+              <a:t>Universite</a:t>
+            </a:r>
+            <a:r>
+              <a:rPr lang="en-US" dirty="0"/>
+              <a:t> Lorraine</a:t>
+            </a:r>
+          </a:p>
+          <a:p>
+            <a:pPr algn="ctr"/>
+            <a:r>
+              <a:rPr lang="en-US" dirty="0"/>
+              <a:t>LORIA</a:t>
             </a:r>
             <a:endParaRPr lang="fr-FR" dirty="0"/>
           </a:p>
@@ -3870,7 +4062,7 @@
     </p:spTree>
     <p:extLst>
       <p:ext uri="{BB962C8B-B14F-4D97-AF65-F5344CB8AC3E}">
-        <p14:creationId xmlns:p14="http://schemas.microsoft.com/office/powerpoint/2010/main" val="1137366925"/>
+        <p14:creationId xmlns:p14="http://schemas.microsoft.com/office/powerpoint/2010/main" val="1401244842"/>
       </p:ext>
     </p:extLst>
   </p:cSld>
@@ -3902,7 +4094,7 @@
           <p:cNvPr id="2" name="Title 1">
             <a:extLst>
               <a:ext uri="{FF2B5EF4-FFF2-40B4-BE49-F238E27FC236}">
-                <a16:creationId xmlns:a16="http://schemas.microsoft.com/office/drawing/2014/main" id="{06C8308B-2D64-4F1B-B202-397AEF3B93B1}"/>
+                <a16:creationId xmlns:a16="http://schemas.microsoft.com/office/drawing/2014/main" id="{E6C2C107-3595-4F52-8FE8-2AFDB70D7BFE}"/>
               </a:ext>
             </a:extLst>
           </p:cNvPr>
@@ -3919,49 +4111,68 @@
           <a:lstStyle/>
           <a:p>
             <a:pPr algn="ctr"/>
+            <a:r>
+              <a:rPr lang="fr-FR" dirty="0">
+                <a:solidFill>
+                  <a:srgbClr val="FF0000"/>
+                </a:solidFill>
+              </a:rPr>
+              <a:t>Formulaire</a:t>
+            </a:r>
             <a:r>
               <a:rPr lang="en-US" dirty="0">
                 <a:solidFill>
                   <a:srgbClr val="FF0000"/>
                 </a:solidFill>
               </a:rPr>
-              <a:t>Validation par Admin</a:t>
-            </a:r>
-            <a:endParaRPr lang="fr-FR" dirty="0">
-              <a:solidFill>
-                <a:srgbClr val="FF0000"/>
-              </a:solidFill>
-            </a:endParaRPr>
-          </a:p>
-        </p:txBody>
-      </p:sp>
-      <p:sp>
-        <p:nvSpPr>
-          <p:cNvPr id="6" name="TextBox 5">
-            <a:extLst>
-              <a:ext uri="{FF2B5EF4-FFF2-40B4-BE49-F238E27FC236}">
-                <a16:creationId xmlns:a16="http://schemas.microsoft.com/office/drawing/2014/main" id="{BF193CE4-C3B8-4071-BAC2-588FBB080F82}"/>
-              </a:ext>
-            </a:extLst>
-          </p:cNvPr>
-          <p:cNvSpPr txBox="1"/>
-          <p:nvPr/>
+              <a:t>  de correction par </a:t>
+            </a:r>
+            <a:r>
+              <a:rPr lang="fr-FR" noProof="1">
+                <a:solidFill>
+                  <a:srgbClr val="FF0000"/>
+                </a:solidFill>
+              </a:rPr>
+              <a:t>utilisateur</a:t>
+            </a:r>
+          </a:p>
+        </p:txBody>
+      </p:sp>
+      <p:sp>
+        <p:nvSpPr>
+          <p:cNvPr id="6" name="Content Placeholder 5">
+            <a:extLst>
+              <a:ext uri="{FF2B5EF4-FFF2-40B4-BE49-F238E27FC236}">
+                <a16:creationId xmlns:a16="http://schemas.microsoft.com/office/drawing/2014/main" id="{3C718E61-325A-49FF-B777-FE683A67A0C2}"/>
+              </a:ext>
+            </a:extLst>
+          </p:cNvPr>
+          <p:cNvSpPr>
+            <a:spLocks noGrp="1"/>
+          </p:cNvSpPr>
+          <p:nvPr>
+            <p:ph idx="1"/>
+          </p:nvPr>
         </p:nvSpPr>
         <p:spPr>
           <a:xfrm>
-            <a:off x="838200" y="4009292"/>
-            <a:ext cx="9206132" cy="646331"/>
-          </a:xfrm>
-          <a:prstGeom prst="rect">
-            <a:avLst/>
-          </a:prstGeom>
-          <a:noFill/>
-        </p:spPr>
-        <p:txBody>
-          <a:bodyPr wrap="square" rtlCol="0">
-            <a:spAutoFit/>
-          </a:bodyPr>
-          <a:lstStyle/>
+            <a:off x="838200" y="3376248"/>
+            <a:ext cx="10515600" cy="1955408"/>
+          </a:xfrm>
+        </p:spPr>
+        <p:txBody>
+          <a:bodyPr/>
+          <a:lstStyle/>
+          <a:p>
+            <a:r>
+              <a:rPr lang="fr-FR" dirty="0"/>
+              <a:t>Désactiver</a:t>
+            </a:r>
+            <a:r>
+              <a:rPr lang="en-US" dirty="0"/>
+              <a:t> “Correct”</a:t>
+            </a:r>
+          </a:p>
           <a:p>
             <a:r>
               <a:rPr lang="en-US" dirty="0" err="1"/>
@@ -3973,23 +4184,53 @@
             </a:r>
             <a:r>
               <a:rPr lang="en-US" dirty="0" err="1"/>
-              <a:t>tous</a:t>
+              <a:t>une</a:t>
             </a:r>
             <a:r>
               <a:rPr lang="en-US" dirty="0"/>
-              <a:t> les </a:t>
+              <a:t> zone de </a:t>
             </a:r>
             <a:r>
               <a:rPr lang="en-US" dirty="0" err="1"/>
-              <a:t>problemes</a:t>
+              <a:t>texte</a:t>
             </a:r>
             <a:r>
               <a:rPr lang="en-US" dirty="0"/>
-              <a:t> et les solutions de la tables CASES avec status “</a:t>
+              <a:t>: Correction </a:t>
             </a:r>
             <a:r>
               <a:rPr lang="en-US" dirty="0" err="1"/>
-              <a:t>en</a:t>
+              <a:t>d’utilisateur</a:t>
+            </a:r>
+            <a:r>
+              <a:rPr lang="en-US" dirty="0"/>
+              <a:t>.</a:t>
+            </a:r>
+          </a:p>
+          <a:p>
+            <a:r>
+              <a:rPr lang="en-US" dirty="0"/>
+              <a:t>Si ok=&gt; insertion </a:t>
+            </a:r>
+            <a:r>
+              <a:rPr lang="en-US" dirty="0" err="1"/>
+              <a:t>dans</a:t>
+            </a:r>
+            <a:r>
+              <a:rPr lang="en-US" dirty="0"/>
+              <a:t> la base de </a:t>
+            </a:r>
+            <a:r>
+              <a:rPr lang="fr-FR" dirty="0"/>
+              <a:t>données</a:t>
+            </a:r>
+            <a:r>
+              <a:rPr lang="en-US" dirty="0"/>
+              <a:t> avec status “</a:t>
+            </a:r>
+            <a:r>
+              <a:rPr lang="en-US" dirty="0" err="1"/>
+              <a:t>En</a:t>
             </a:r>
             <a:r>
               <a:rPr lang="en-US" dirty="0"/>
@@ -4001,53 +4242,30 @@
             </a:r>
             <a:r>
               <a:rPr lang="en-US" dirty="0"/>
-              <a:t> </a:t>
-            </a:r>
-            <a:r>
-              <a:rPr lang="en-US" dirty="0" err="1"/>
-              <a:t>ou</a:t>
-            </a:r>
-            <a:r>
-              <a:rPr lang="en-US" dirty="0"/>
-              <a:t> false”</a:t>
-            </a:r>
-          </a:p>
-          <a:p>
-            <a:r>
-              <a:rPr lang="en-US" dirty="0"/>
-              <a:t>S</a:t>
-            </a:r>
-            <a:r>
-              <a:rPr lang="fr-FR" dirty="0"/>
-              <a:t>i ok  change </a:t>
-            </a:r>
-            <a:r>
-              <a:rPr lang="fr-FR" dirty="0" err="1"/>
-              <a:t>status</a:t>
-            </a:r>
-            <a:r>
-              <a:rPr lang="fr-FR" dirty="0"/>
-              <a:t> en TRUE</a:t>
-            </a:r>
+              <a:t>”</a:t>
+            </a:r>
+          </a:p>
+          <a:p>
             <a:endParaRPr lang="en-US" dirty="0"/>
+          </a:p>
+          <a:p>
+            <a:endParaRPr lang="fr-FR" dirty="0"/>
           </a:p>
         </p:txBody>
       </p:sp>
       <p:pic>
         <p:nvPicPr>
-          <p:cNvPr id="7" name="Content Placeholder 6">
-            <a:extLst>
-              <a:ext uri="{FF2B5EF4-FFF2-40B4-BE49-F238E27FC236}">
-                <a16:creationId xmlns:a16="http://schemas.microsoft.com/office/drawing/2014/main" id="{5C28F538-8C1B-4361-916B-4E631932EC04}"/>
+          <p:cNvPr id="7" name="Picture 6">
+            <a:extLst>
+              <a:ext uri="{FF2B5EF4-FFF2-40B4-BE49-F238E27FC236}">
+                <a16:creationId xmlns:a16="http://schemas.microsoft.com/office/drawing/2014/main" id="{7D9AD68E-86C9-408D-A1B9-AF9F8A6913A8}"/>
               </a:ext>
             </a:extLst>
           </p:cNvPr>
           <p:cNvPicPr>
-            <a:picLocks noGrp="1" noChangeAspect="1"/>
+            <a:picLocks noChangeAspect="1"/>
           </p:cNvPicPr>
-          <p:nvPr>
-            <p:ph idx="1"/>
-          </p:nvPr>
+          <p:nvPr/>
         </p:nvPicPr>
         <p:blipFill>
           <a:blip r:embed="rId2"/>
@@ -4057,14 +4275,409 @@
         </p:blipFill>
         <p:spPr>
           <a:xfrm>
-            <a:off x="3128962" y="1690688"/>
-            <a:ext cx="5934075" cy="1933575"/>
+            <a:off x="838200" y="1580416"/>
+            <a:ext cx="10515600" cy="1514475"/>
           </a:xfrm>
           <a:prstGeom prst="rect">
             <a:avLst/>
           </a:prstGeom>
         </p:spPr>
       </p:pic>
+    </p:spTree>
+    <p:extLst>
+      <p:ext uri="{BB962C8B-B14F-4D97-AF65-F5344CB8AC3E}">
+        <p14:creationId xmlns:p14="http://schemas.microsoft.com/office/powerpoint/2010/main" val="151076299"/>
+      </p:ext>
+    </p:extLst>
+  </p:cSld>
+  <p:clrMapOvr>
+    <a:masterClrMapping/>
+  </p:clrMapOvr>
+</p:sld>
+</file>
+
+<file path=ppt/slides/slide11.xml><?xml version="1.0" encoding="utf-8"?>
+<p:sld xmlns:a="http://schemas.openxmlformats.org/drawingml/2006/main" xmlns:r="http://schemas.openxmlformats.org/officeDocument/2006/relationships" xmlns:p="http://schemas.openxmlformats.org/presentationml/2006/main">
+  <p:cSld>
+    <p:spTree>
+      <p:nvGrpSpPr>
+        <p:cNvPr id="1" name=""/>
+        <p:cNvGrpSpPr/>
+        <p:nvPr/>
+      </p:nvGrpSpPr>
+      <p:grpSpPr>
+        <a:xfrm>
+          <a:off x="0" y="0"/>
+          <a:ext cx="0" cy="0"/>
+          <a:chOff x="0" y="0"/>
+          <a:chExt cx="0" cy="0"/>
+        </a:xfrm>
+      </p:grpSpPr>
+      <p:sp>
+        <p:nvSpPr>
+          <p:cNvPr id="2" name="Title 1">
+            <a:extLst>
+              <a:ext uri="{FF2B5EF4-FFF2-40B4-BE49-F238E27FC236}">
+                <a16:creationId xmlns:a16="http://schemas.microsoft.com/office/drawing/2014/main" id="{8CEB871E-8D26-4919-9548-B82AAD762BF8}"/>
+              </a:ext>
+            </a:extLst>
+          </p:cNvPr>
+          <p:cNvSpPr>
+            <a:spLocks noGrp="1"/>
+          </p:cNvSpPr>
+          <p:nvPr>
+            <p:ph type="title"/>
+          </p:nvPr>
+        </p:nvSpPr>
+        <p:spPr/>
+        <p:txBody>
+          <a:bodyPr/>
+          <a:lstStyle/>
+          <a:p>
+            <a:pPr algn="ctr"/>
+            <a:r>
+              <a:rPr lang="en-US" dirty="0">
+                <a:solidFill>
+                  <a:srgbClr val="FF0000"/>
+                </a:solidFill>
+              </a:rPr>
+              <a:t>Login Admin</a:t>
+            </a:r>
+            <a:endParaRPr lang="fr-FR" dirty="0">
+              <a:solidFill>
+                <a:srgbClr val="FF0000"/>
+              </a:solidFill>
+            </a:endParaRPr>
+          </a:p>
+        </p:txBody>
+      </p:sp>
+      <p:sp>
+        <p:nvSpPr>
+          <p:cNvPr id="3" name="Content Placeholder 2">
+            <a:extLst>
+              <a:ext uri="{FF2B5EF4-FFF2-40B4-BE49-F238E27FC236}">
+                <a16:creationId xmlns:a16="http://schemas.microsoft.com/office/drawing/2014/main" id="{722B5949-B250-4680-B5BC-99AC44E88476}"/>
+              </a:ext>
+            </a:extLst>
+          </p:cNvPr>
+          <p:cNvSpPr>
+            <a:spLocks noGrp="1"/>
+          </p:cNvSpPr>
+          <p:nvPr>
+            <p:ph idx="1"/>
+          </p:nvPr>
+        </p:nvSpPr>
+        <p:spPr>
+          <a:xfrm>
+            <a:off x="838200" y="1825625"/>
+            <a:ext cx="10515600" cy="1494350"/>
+          </a:xfrm>
+        </p:spPr>
+        <p:txBody>
+          <a:bodyPr/>
+          <a:lstStyle/>
+          <a:p>
+            <a:r>
+              <a:rPr lang="fr-FR" dirty="0"/>
+              <a:t>Insertion dans la base des cas des fichier csv</a:t>
+            </a:r>
+          </a:p>
+          <a:p>
+            <a:r>
+              <a:rPr lang="fr-FR" dirty="0"/>
+              <a:t>Droit: validée les problèmes + les solutions proposées par les utilisateurs.</a:t>
+            </a:r>
+          </a:p>
+        </p:txBody>
+      </p:sp>
+    </p:spTree>
+    <p:extLst>
+      <p:ext uri="{BB962C8B-B14F-4D97-AF65-F5344CB8AC3E}">
+        <p14:creationId xmlns:p14="http://schemas.microsoft.com/office/powerpoint/2010/main" val="2721370258"/>
+      </p:ext>
+    </p:extLst>
+  </p:cSld>
+  <p:clrMapOvr>
+    <a:masterClrMapping/>
+  </p:clrMapOvr>
+</p:sld>
+</file>
+
+<file path=ppt/slides/slide12.xml><?xml version="1.0" encoding="utf-8"?>
+<p:sld xmlns:a="http://schemas.openxmlformats.org/drawingml/2006/main" xmlns:r="http://schemas.openxmlformats.org/officeDocument/2006/relationships" xmlns:p="http://schemas.openxmlformats.org/presentationml/2006/main">
+  <p:cSld>
+    <p:spTree>
+      <p:nvGrpSpPr>
+        <p:cNvPr id="1" name=""/>
+        <p:cNvGrpSpPr/>
+        <p:nvPr/>
+      </p:nvGrpSpPr>
+      <p:grpSpPr>
+        <a:xfrm>
+          <a:off x="0" y="0"/>
+          <a:ext cx="0" cy="0"/>
+          <a:chOff x="0" y="0"/>
+          <a:chExt cx="0" cy="0"/>
+        </a:xfrm>
+      </p:grpSpPr>
+      <p:sp>
+        <p:nvSpPr>
+          <p:cNvPr id="2" name="Title 1">
+            <a:extLst>
+              <a:ext uri="{FF2B5EF4-FFF2-40B4-BE49-F238E27FC236}">
+                <a16:creationId xmlns:a16="http://schemas.microsoft.com/office/drawing/2014/main" id="{1994AC65-47C5-4398-8CBE-2E28F5525A33}"/>
+              </a:ext>
+            </a:extLst>
+          </p:cNvPr>
+          <p:cNvSpPr>
+            <a:spLocks noGrp="1"/>
+          </p:cNvSpPr>
+          <p:nvPr>
+            <p:ph type="title"/>
+          </p:nvPr>
+        </p:nvSpPr>
+        <p:spPr/>
+        <p:txBody>
+          <a:bodyPr/>
+          <a:lstStyle/>
+          <a:p>
+            <a:pPr algn="ctr"/>
+            <a:r>
+              <a:rPr lang="en-US" dirty="0">
+                <a:solidFill>
+                  <a:srgbClr val="FF0000"/>
+                </a:solidFill>
+              </a:rPr>
+              <a:t>Identification Admin</a:t>
+            </a:r>
+            <a:endParaRPr lang="fr-FR" dirty="0">
+              <a:solidFill>
+                <a:srgbClr val="FF0000"/>
+              </a:solidFill>
+            </a:endParaRPr>
+          </a:p>
+        </p:txBody>
+      </p:sp>
+      <p:pic>
+        <p:nvPicPr>
+          <p:cNvPr id="4" name="Content Placeholder 3">
+            <a:extLst>
+              <a:ext uri="{FF2B5EF4-FFF2-40B4-BE49-F238E27FC236}">
+                <a16:creationId xmlns:a16="http://schemas.microsoft.com/office/drawing/2014/main" id="{F30FF434-0791-407C-ACFB-2584AB3A60E8}"/>
+              </a:ext>
+            </a:extLst>
+          </p:cNvPr>
+          <p:cNvPicPr>
+            <a:picLocks noGrp="1" noChangeAspect="1"/>
+          </p:cNvPicPr>
+          <p:nvPr>
+            <p:ph sz="half" idx="1"/>
+          </p:nvPr>
+        </p:nvPicPr>
+        <p:blipFill>
+          <a:blip r:embed="rId2"/>
+          <a:stretch>
+            <a:fillRect/>
+          </a:stretch>
+        </p:blipFill>
+        <p:spPr>
+          <a:xfrm>
+            <a:off x="7409717" y="2256900"/>
+            <a:ext cx="3381375" cy="2952750"/>
+          </a:xfrm>
+          <a:prstGeom prst="rect">
+            <a:avLst/>
+          </a:prstGeom>
+        </p:spPr>
+      </p:pic>
+      <p:sp>
+        <p:nvSpPr>
+          <p:cNvPr id="5" name="Content Placeholder 4">
+            <a:extLst>
+              <a:ext uri="{FF2B5EF4-FFF2-40B4-BE49-F238E27FC236}">
+                <a16:creationId xmlns:a16="http://schemas.microsoft.com/office/drawing/2014/main" id="{2AB17D94-49C5-4D22-A57B-4C501C0BDA5A}"/>
+              </a:ext>
+            </a:extLst>
+          </p:cNvPr>
+          <p:cNvSpPr>
+            <a:spLocks noGrp="1"/>
+          </p:cNvSpPr>
+          <p:nvPr>
+            <p:ph sz="half" idx="2"/>
+          </p:nvPr>
+        </p:nvSpPr>
+        <p:spPr>
+          <a:xfrm>
+            <a:off x="728003" y="2683021"/>
+            <a:ext cx="5181600" cy="1621693"/>
+          </a:xfrm>
+        </p:spPr>
+        <p:txBody>
+          <a:bodyPr/>
+          <a:lstStyle/>
+          <a:p>
+            <a:r>
+              <a:rPr lang="fr-FR" dirty="0"/>
+              <a:t>Pop up</a:t>
+            </a:r>
+          </a:p>
+          <a:p>
+            <a:r>
+              <a:rPr lang="fr-FR" dirty="0"/>
+              <a:t>Pas inscription disponible</a:t>
+            </a:r>
+          </a:p>
+        </p:txBody>
+      </p:sp>
+    </p:spTree>
+    <p:extLst>
+      <p:ext uri="{BB962C8B-B14F-4D97-AF65-F5344CB8AC3E}">
+        <p14:creationId xmlns:p14="http://schemas.microsoft.com/office/powerpoint/2010/main" val="4119237707"/>
+      </p:ext>
+    </p:extLst>
+  </p:cSld>
+  <p:clrMapOvr>
+    <a:masterClrMapping/>
+  </p:clrMapOvr>
+</p:sld>
+</file>
+
+<file path=ppt/slides/slide13.xml><?xml version="1.0" encoding="utf-8"?>
+<p:sld xmlns:a="http://schemas.openxmlformats.org/drawingml/2006/main" xmlns:r="http://schemas.openxmlformats.org/officeDocument/2006/relationships" xmlns:p="http://schemas.openxmlformats.org/presentationml/2006/main">
+  <p:cSld>
+    <p:spTree>
+      <p:nvGrpSpPr>
+        <p:cNvPr id="1" name=""/>
+        <p:cNvGrpSpPr/>
+        <p:nvPr/>
+      </p:nvGrpSpPr>
+      <p:grpSpPr>
+        <a:xfrm>
+          <a:off x="0" y="0"/>
+          <a:ext cx="0" cy="0"/>
+          <a:chOff x="0" y="0"/>
+          <a:chExt cx="0" cy="0"/>
+        </a:xfrm>
+      </p:grpSpPr>
+      <p:sp>
+        <p:nvSpPr>
+          <p:cNvPr id="2" name="Title 1">
+            <a:extLst>
+              <a:ext uri="{FF2B5EF4-FFF2-40B4-BE49-F238E27FC236}">
+                <a16:creationId xmlns:a16="http://schemas.microsoft.com/office/drawing/2014/main" id="{06C8308B-2D64-4F1B-B202-397AEF3B93B1}"/>
+              </a:ext>
+            </a:extLst>
+          </p:cNvPr>
+          <p:cNvSpPr>
+            <a:spLocks noGrp="1"/>
+          </p:cNvSpPr>
+          <p:nvPr>
+            <p:ph type="title"/>
+          </p:nvPr>
+        </p:nvSpPr>
+        <p:spPr/>
+        <p:txBody>
+          <a:bodyPr/>
+          <a:lstStyle/>
+          <a:p>
+            <a:pPr algn="ctr"/>
+            <a:r>
+              <a:rPr lang="en-US" dirty="0">
+                <a:solidFill>
+                  <a:srgbClr val="FF0000"/>
+                </a:solidFill>
+              </a:rPr>
+              <a:t>Interface </a:t>
+            </a:r>
+            <a:r>
+              <a:rPr lang="en-US" dirty="0" err="1">
+                <a:solidFill>
+                  <a:srgbClr val="FF0000"/>
+                </a:solidFill>
+              </a:rPr>
+              <a:t>administrateur</a:t>
+            </a:r>
+            <a:endParaRPr lang="fr-FR" dirty="0">
+              <a:solidFill>
+                <a:srgbClr val="FF0000"/>
+              </a:solidFill>
+            </a:endParaRPr>
+          </a:p>
+        </p:txBody>
+      </p:sp>
+      <p:pic>
+        <p:nvPicPr>
+          <p:cNvPr id="7" name="Content Placeholder 6">
+            <a:extLst>
+              <a:ext uri="{FF2B5EF4-FFF2-40B4-BE49-F238E27FC236}">
+                <a16:creationId xmlns:a16="http://schemas.microsoft.com/office/drawing/2014/main" id="{5C28F538-8C1B-4361-916B-4E631932EC04}"/>
+              </a:ext>
+            </a:extLst>
+          </p:cNvPr>
+          <p:cNvPicPr>
+            <a:picLocks noGrp="1" noChangeAspect="1"/>
+          </p:cNvPicPr>
+          <p:nvPr>
+            <p:ph sz="half" idx="1"/>
+          </p:nvPr>
+        </p:nvPicPr>
+        <p:blipFill>
+          <a:blip r:embed="rId2"/>
+          <a:stretch>
+            <a:fillRect/>
+          </a:stretch>
+        </p:blipFill>
+        <p:spPr>
+          <a:xfrm>
+            <a:off x="3505200" y="1690688"/>
+            <a:ext cx="5181600" cy="1688386"/>
+          </a:xfrm>
+          <a:prstGeom prst="rect">
+            <a:avLst/>
+          </a:prstGeom>
+        </p:spPr>
+      </p:pic>
+      <p:sp>
+        <p:nvSpPr>
+          <p:cNvPr id="3" name="Content Placeholder 2">
+            <a:extLst>
+              <a:ext uri="{FF2B5EF4-FFF2-40B4-BE49-F238E27FC236}">
+                <a16:creationId xmlns:a16="http://schemas.microsoft.com/office/drawing/2014/main" id="{2CB9F454-7104-4DEA-B771-69490D884936}"/>
+              </a:ext>
+            </a:extLst>
+          </p:cNvPr>
+          <p:cNvSpPr>
+            <a:spLocks noGrp="1"/>
+          </p:cNvSpPr>
+          <p:nvPr>
+            <p:ph sz="half" idx="2"/>
+          </p:nvPr>
+        </p:nvSpPr>
+        <p:spPr>
+          <a:xfrm>
+            <a:off x="914400" y="3874020"/>
+            <a:ext cx="10439400" cy="1661234"/>
+          </a:xfrm>
+        </p:spPr>
+        <p:txBody>
+          <a:bodyPr/>
+          <a:lstStyle/>
+          <a:p>
+            <a:r>
+              <a:rPr lang="fr-FR" dirty="0"/>
+              <a:t>« Afficher »: dans un tableau tous les cases avec </a:t>
+            </a:r>
+            <a:r>
+              <a:rPr lang="fr-FR" dirty="0" err="1"/>
+              <a:t>status</a:t>
+            </a:r>
+            <a:r>
+              <a:rPr lang="fr-FR" dirty="0"/>
+              <a:t> « false ou en attente »</a:t>
+            </a:r>
+          </a:p>
+        </p:txBody>
+      </p:sp>
     </p:spTree>
     <p:extLst>
       <p:ext uri="{BB962C8B-B14F-4D97-AF65-F5344CB8AC3E}">
@@ -4100,7 +4713,7 @@
           <p:cNvPr id="2" name="Title 1">
             <a:extLst>
               <a:ext uri="{FF2B5EF4-FFF2-40B4-BE49-F238E27FC236}">
-                <a16:creationId xmlns:a16="http://schemas.microsoft.com/office/drawing/2014/main" id="{ECDCC142-4404-43ED-872E-DB617DED987F}"/>
+                <a16:creationId xmlns:a16="http://schemas.microsoft.com/office/drawing/2014/main" id="{CE5B8B26-B558-455C-94F2-68E896040BEE}"/>
               </a:ext>
             </a:extLst>
           </p:cNvPr>
@@ -4123,7 +4736,7 @@
                   <a:srgbClr val="FF0000"/>
                 </a:solidFill>
               </a:rPr>
-              <a:t>BASE DE DONNEES</a:t>
+              <a:t>LORIA</a:t>
             </a:r>
             <a:endParaRPr lang="fr-FR" dirty="0">
               <a:solidFill>
@@ -4133,45 +4746,62 @@
           </a:p>
         </p:txBody>
       </p:sp>
-      <p:pic>
-        <p:nvPicPr>
-          <p:cNvPr id="11" name="Content Placeholder 10">
-            <a:extLst>
-              <a:ext uri="{FF2B5EF4-FFF2-40B4-BE49-F238E27FC236}">
-                <a16:creationId xmlns:a16="http://schemas.microsoft.com/office/drawing/2014/main" id="{1FE8A265-964F-4102-B1A8-02FF116364D0}"/>
-              </a:ext>
-            </a:extLst>
-          </p:cNvPr>
-          <p:cNvPicPr>
-            <a:picLocks noGrp="1" noChangeAspect="1"/>
-          </p:cNvPicPr>
+      <p:sp>
+        <p:nvSpPr>
+          <p:cNvPr id="3" name="Content Placeholder 2">
+            <a:extLst>
+              <a:ext uri="{FF2B5EF4-FFF2-40B4-BE49-F238E27FC236}">
+                <a16:creationId xmlns:a16="http://schemas.microsoft.com/office/drawing/2014/main" id="{5E49AA2A-EE77-416E-BF23-C831891F0423}"/>
+              </a:ext>
+            </a:extLst>
+          </p:cNvPr>
+          <p:cNvSpPr>
+            <a:spLocks noGrp="1"/>
+          </p:cNvSpPr>
           <p:nvPr>
             <p:ph idx="1"/>
           </p:nvPr>
-        </p:nvPicPr>
-        <p:blipFill>
-          <a:blip r:embed="rId2">
-            <a:extLst>
-              <a:ext uri="{28A0092B-C50C-407E-A947-70E740481C1C}">
-                <a14:useLocalDpi xmlns:a14="http://schemas.microsoft.com/office/drawing/2010/main" val="0"/>
-              </a:ext>
-            </a:extLst>
-          </a:blip>
-          <a:stretch>
-            <a:fillRect/>
-          </a:stretch>
-        </p:blipFill>
-        <p:spPr>
-          <a:xfrm>
-            <a:off x="3052689" y="2423759"/>
-            <a:ext cx="5238750" cy="2420938"/>
-          </a:xfrm>
-        </p:spPr>
-      </p:pic>
+        </p:nvSpPr>
+        <p:spPr/>
+        <p:txBody>
+          <a:bodyPr/>
+          <a:lstStyle/>
+          <a:p>
+            <a:r>
+              <a:rPr lang="fr-FR" dirty="0"/>
+              <a:t>Laboratoire lorrain de recherche en informatique et ses applications.</a:t>
+            </a:r>
+          </a:p>
+          <a:p>
+            <a:r>
+              <a:rPr lang="fr-FR" dirty="0"/>
+              <a:t>En 1997.</a:t>
+            </a:r>
+          </a:p>
+          <a:p>
+            <a:r>
+              <a:rPr lang="fr-FR" dirty="0"/>
+              <a:t>Unité Mixte de Recherche.</a:t>
+            </a:r>
+          </a:p>
+          <a:p>
+            <a:r>
+              <a:rPr lang="fr-FR" dirty="0"/>
+              <a:t>Le CNRS, l’Université de Lorraine et Inria.</a:t>
+            </a:r>
+          </a:p>
+          <a:p>
+            <a:r>
+              <a:rPr lang="fr-FR" dirty="0"/>
+              <a:t>28 équipes structurées en 5 départements.</a:t>
+            </a:r>
+          </a:p>
+        </p:txBody>
+      </p:sp>
     </p:spTree>
     <p:extLst>
       <p:ext uri="{BB962C8B-B14F-4D97-AF65-F5344CB8AC3E}">
-        <p14:creationId xmlns:p14="http://schemas.microsoft.com/office/powerpoint/2010/main" val="3659057012"/>
+        <p14:creationId xmlns:p14="http://schemas.microsoft.com/office/powerpoint/2010/main" val="4148012899"/>
       </p:ext>
     </p:extLst>
   </p:cSld>
@@ -4203,7 +4833,7 @@
           <p:cNvPr id="2" name="Title 1">
             <a:extLst>
               <a:ext uri="{FF2B5EF4-FFF2-40B4-BE49-F238E27FC236}">
-                <a16:creationId xmlns:a16="http://schemas.microsoft.com/office/drawing/2014/main" id="{A176E8B9-32B7-46B0-AF71-1CBE7A2FB291}"/>
+                <a16:creationId xmlns:a16="http://schemas.microsoft.com/office/drawing/2014/main" id="{DB5E7626-5C07-4D1C-A480-13C7FBF6606E}"/>
               </a:ext>
             </a:extLst>
           </p:cNvPr>
@@ -4214,26 +4844,39 @@
             <p:ph type="title"/>
           </p:nvPr>
         </p:nvSpPr>
-        <p:spPr/>
+        <p:spPr>
+          <a:xfrm>
+            <a:off x="838200" y="365125"/>
+            <a:ext cx="10515600" cy="1325563"/>
+          </a:xfrm>
+        </p:spPr>
         <p:txBody>
           <a:bodyPr/>
           <a:lstStyle/>
           <a:p>
             <a:pPr algn="ctr"/>
             <a:r>
-              <a:rPr lang="en-US" dirty="0"/>
-              <a:t>CASES</a:t>
-            </a:r>
-            <a:endParaRPr lang="fr-FR" dirty="0"/>
+              <a:rPr lang="en-US" dirty="0">
+                <a:solidFill>
+                  <a:srgbClr val="FF0000"/>
+                </a:solidFill>
+              </a:rPr>
+              <a:t>GENERALITE</a:t>
+            </a:r>
+            <a:endParaRPr lang="fr-FR" dirty="0">
+              <a:solidFill>
+                <a:srgbClr val="FF0000"/>
+              </a:solidFill>
+            </a:endParaRPr>
           </a:p>
         </p:txBody>
       </p:sp>
       <p:pic>
         <p:nvPicPr>
-          <p:cNvPr id="7" name="Content Placeholder 6">
-            <a:extLst>
-              <a:ext uri="{FF2B5EF4-FFF2-40B4-BE49-F238E27FC236}">
-                <a16:creationId xmlns:a16="http://schemas.microsoft.com/office/drawing/2014/main" id="{25026BD0-00B5-44FD-BF06-24A9BBBDD409}"/>
+          <p:cNvPr id="6" name="Content Placeholder 5">
+            <a:extLst>
+              <a:ext uri="{FF2B5EF4-FFF2-40B4-BE49-F238E27FC236}">
+                <a16:creationId xmlns:a16="http://schemas.microsoft.com/office/drawing/2014/main" id="{E11869FC-DC31-4DDE-9EDC-D36603FC60B6}"/>
               </a:ext>
             </a:extLst>
           </p:cNvPr>
@@ -4252,8 +4895,8 @@
         </p:blipFill>
         <p:spPr>
           <a:xfrm>
-            <a:off x="5299966" y="1582182"/>
-            <a:ext cx="1592067" cy="2773807"/>
+            <a:off x="6588662" y="1729277"/>
+            <a:ext cx="1875793" cy="1568046"/>
           </a:xfrm>
           <a:prstGeom prst="rect">
             <a:avLst/>
@@ -4262,10 +4905,10 @@
       </p:pic>
       <p:pic>
         <p:nvPicPr>
-          <p:cNvPr id="9" name="Picture 8">
-            <a:extLst>
-              <a:ext uri="{FF2B5EF4-FFF2-40B4-BE49-F238E27FC236}">
-                <a16:creationId xmlns:a16="http://schemas.microsoft.com/office/drawing/2014/main" id="{37274AEE-C7E4-40E3-B4F0-688FD3868411}"/>
+          <p:cNvPr id="7" name="Picture 6">
+            <a:extLst>
+              <a:ext uri="{FF2B5EF4-FFF2-40B4-BE49-F238E27FC236}">
+                <a16:creationId xmlns:a16="http://schemas.microsoft.com/office/drawing/2014/main" id="{50A3438A-A24E-4CD9-86E2-DAB3925EA04A}"/>
               </a:ext>
             </a:extLst>
           </p:cNvPr>
@@ -4282,18 +4925,486 @@
         </p:blipFill>
         <p:spPr>
           <a:xfrm>
-            <a:off x="1604961" y="5157568"/>
-            <a:ext cx="8982075" cy="228600"/>
+            <a:off x="6652925" y="4675182"/>
+            <a:ext cx="1747269" cy="1486266"/>
           </a:xfrm>
           <a:prstGeom prst="rect">
             <a:avLst/>
           </a:prstGeom>
         </p:spPr>
       </p:pic>
+      <p:pic>
+        <p:nvPicPr>
+          <p:cNvPr id="8" name="Picture 7">
+            <a:extLst>
+              <a:ext uri="{FF2B5EF4-FFF2-40B4-BE49-F238E27FC236}">
+                <a16:creationId xmlns:a16="http://schemas.microsoft.com/office/drawing/2014/main" id="{BE6AEC60-74BD-45B8-877D-3EEC387768BD}"/>
+              </a:ext>
+            </a:extLst>
+          </p:cNvPr>
+          <p:cNvPicPr>
+            <a:picLocks noChangeAspect="1"/>
+          </p:cNvPicPr>
+          <p:nvPr/>
+        </p:nvPicPr>
+        <p:blipFill>
+          <a:blip r:embed="rId4"/>
+          <a:stretch>
+            <a:fillRect/>
+          </a:stretch>
+        </p:blipFill>
+        <p:spPr>
+          <a:xfrm>
+            <a:off x="10023057" y="3845447"/>
+            <a:ext cx="1016460" cy="697448"/>
+          </a:xfrm>
+          <a:prstGeom prst="rect">
+            <a:avLst/>
+          </a:prstGeom>
+        </p:spPr>
+      </p:pic>
+      <p:pic>
+        <p:nvPicPr>
+          <p:cNvPr id="9" name="Picture 8">
+            <a:extLst>
+              <a:ext uri="{FF2B5EF4-FFF2-40B4-BE49-F238E27FC236}">
+                <a16:creationId xmlns:a16="http://schemas.microsoft.com/office/drawing/2014/main" id="{955F07BA-36A7-48FA-94CF-B9C87925C82A}"/>
+              </a:ext>
+            </a:extLst>
+          </p:cNvPr>
+          <p:cNvPicPr>
+            <a:picLocks noChangeAspect="1"/>
+          </p:cNvPicPr>
+          <p:nvPr/>
+        </p:nvPicPr>
+        <p:blipFill>
+          <a:blip r:embed="rId5"/>
+          <a:stretch>
+            <a:fillRect/>
+          </a:stretch>
+        </p:blipFill>
+        <p:spPr>
+          <a:xfrm>
+            <a:off x="3752077" y="5013164"/>
+            <a:ext cx="761729" cy="697448"/>
+          </a:xfrm>
+          <a:prstGeom prst="rect">
+            <a:avLst/>
+          </a:prstGeom>
+        </p:spPr>
+      </p:pic>
+      <p:sp>
+        <p:nvSpPr>
+          <p:cNvPr id="10" name="Arrow: Down 9">
+            <a:extLst>
+              <a:ext uri="{FF2B5EF4-FFF2-40B4-BE49-F238E27FC236}">
+                <a16:creationId xmlns:a16="http://schemas.microsoft.com/office/drawing/2014/main" id="{C22D1135-9F3F-4E68-9F80-4FAD8B8104C8}"/>
+              </a:ext>
+            </a:extLst>
+          </p:cNvPr>
+          <p:cNvSpPr/>
+          <p:nvPr/>
+        </p:nvSpPr>
+        <p:spPr>
+          <a:xfrm rot="16200000">
+            <a:off x="5267590" y="4941844"/>
+            <a:ext cx="631551" cy="1175102"/>
+          </a:xfrm>
+          <a:prstGeom prst="downArrow">
+            <a:avLst/>
+          </a:prstGeom>
+        </p:spPr>
+        <p:style>
+          <a:lnRef idx="2">
+            <a:schemeClr val="accent1">
+              <a:shade val="50000"/>
+            </a:schemeClr>
+          </a:lnRef>
+          <a:fillRef idx="1">
+            <a:schemeClr val="accent1"/>
+          </a:fillRef>
+          <a:effectRef idx="0">
+            <a:schemeClr val="accent1"/>
+          </a:effectRef>
+          <a:fontRef idx="minor">
+            <a:schemeClr val="lt1"/>
+          </a:fontRef>
+        </p:style>
+        <p:txBody>
+          <a:bodyPr rtlCol="0" anchor="ctr"/>
+          <a:lstStyle/>
+          <a:p>
+            <a:pPr algn="ctr"/>
+            <a:endParaRPr lang="fr-FR"/>
+          </a:p>
+        </p:txBody>
+      </p:sp>
+      <p:sp>
+        <p:nvSpPr>
+          <p:cNvPr id="12" name="Arrow: Up-Down 11">
+            <a:extLst>
+              <a:ext uri="{FF2B5EF4-FFF2-40B4-BE49-F238E27FC236}">
+                <a16:creationId xmlns:a16="http://schemas.microsoft.com/office/drawing/2014/main" id="{EA1C6480-C025-4B38-AB18-3BD888E8BCBD}"/>
+              </a:ext>
+            </a:extLst>
+          </p:cNvPr>
+          <p:cNvSpPr/>
+          <p:nvPr/>
+        </p:nvSpPr>
+        <p:spPr>
+          <a:xfrm>
+            <a:off x="7245617" y="3447680"/>
+            <a:ext cx="604911" cy="926788"/>
+          </a:xfrm>
+          <a:prstGeom prst="upDownArrow">
+            <a:avLst/>
+          </a:prstGeom>
+        </p:spPr>
+        <p:style>
+          <a:lnRef idx="2">
+            <a:schemeClr val="accent1">
+              <a:shade val="50000"/>
+            </a:schemeClr>
+          </a:lnRef>
+          <a:fillRef idx="1">
+            <a:schemeClr val="accent1"/>
+          </a:fillRef>
+          <a:effectRef idx="0">
+            <a:schemeClr val="accent1"/>
+          </a:effectRef>
+          <a:fontRef idx="minor">
+            <a:schemeClr val="lt1"/>
+          </a:fontRef>
+        </p:style>
+        <p:txBody>
+          <a:bodyPr rtlCol="0" anchor="ctr"/>
+          <a:lstStyle/>
+          <a:p>
+            <a:pPr algn="ctr"/>
+            <a:endParaRPr lang="fr-FR"/>
+          </a:p>
+        </p:txBody>
+      </p:sp>
+      <p:sp>
+        <p:nvSpPr>
+          <p:cNvPr id="13" name="Arrow: Right 12">
+            <a:extLst>
+              <a:ext uri="{FF2B5EF4-FFF2-40B4-BE49-F238E27FC236}">
+                <a16:creationId xmlns:a16="http://schemas.microsoft.com/office/drawing/2014/main" id="{B827C765-99DF-4224-9D2A-D454F7AA7D28}"/>
+              </a:ext>
+            </a:extLst>
+          </p:cNvPr>
+          <p:cNvSpPr/>
+          <p:nvPr/>
+        </p:nvSpPr>
+        <p:spPr>
+          <a:xfrm rot="13153555">
+            <a:off x="8568803" y="2758436"/>
+            <a:ext cx="1083212" cy="645401"/>
+          </a:xfrm>
+          <a:prstGeom prst="rightArrow">
+            <a:avLst/>
+          </a:prstGeom>
+        </p:spPr>
+        <p:style>
+          <a:lnRef idx="2">
+            <a:schemeClr val="accent1">
+              <a:shade val="50000"/>
+            </a:schemeClr>
+          </a:lnRef>
+          <a:fillRef idx="1">
+            <a:schemeClr val="accent1"/>
+          </a:fillRef>
+          <a:effectRef idx="0">
+            <a:schemeClr val="accent1"/>
+          </a:effectRef>
+          <a:fontRef idx="minor">
+            <a:schemeClr val="lt1"/>
+          </a:fontRef>
+        </p:style>
+        <p:txBody>
+          <a:bodyPr rtlCol="0" anchor="ctr"/>
+          <a:lstStyle/>
+          <a:p>
+            <a:pPr algn="ctr"/>
+            <a:endParaRPr lang="fr-FR"/>
+          </a:p>
+        </p:txBody>
+      </p:sp>
+      <p:sp>
+        <p:nvSpPr>
+          <p:cNvPr id="14" name="Arrow: Down 13">
+            <a:extLst>
+              <a:ext uri="{FF2B5EF4-FFF2-40B4-BE49-F238E27FC236}">
+                <a16:creationId xmlns:a16="http://schemas.microsoft.com/office/drawing/2014/main" id="{1971E3EE-7DC3-491F-9B5B-D2677C3BE5F9}"/>
+              </a:ext>
+            </a:extLst>
+          </p:cNvPr>
+          <p:cNvSpPr/>
+          <p:nvPr/>
+        </p:nvSpPr>
+        <p:spPr>
+          <a:xfrm rot="14567114">
+            <a:off x="8751340" y="4392323"/>
+            <a:ext cx="631551" cy="1175102"/>
+          </a:xfrm>
+          <a:prstGeom prst="downArrow">
+            <a:avLst/>
+          </a:prstGeom>
+        </p:spPr>
+        <p:style>
+          <a:lnRef idx="2">
+            <a:schemeClr val="accent1">
+              <a:shade val="50000"/>
+            </a:schemeClr>
+          </a:lnRef>
+          <a:fillRef idx="1">
+            <a:schemeClr val="accent1"/>
+          </a:fillRef>
+          <a:effectRef idx="0">
+            <a:schemeClr val="accent1"/>
+          </a:effectRef>
+          <a:fontRef idx="minor">
+            <a:schemeClr val="lt1"/>
+          </a:fontRef>
+        </p:style>
+        <p:txBody>
+          <a:bodyPr rtlCol="0" anchor="ctr"/>
+          <a:lstStyle/>
+          <a:p>
+            <a:pPr algn="ctr"/>
+            <a:endParaRPr lang="fr-FR"/>
+          </a:p>
+        </p:txBody>
+      </p:sp>
+      <p:sp>
+        <p:nvSpPr>
+          <p:cNvPr id="16" name="Content Placeholder 2">
+            <a:extLst>
+              <a:ext uri="{FF2B5EF4-FFF2-40B4-BE49-F238E27FC236}">
+                <a16:creationId xmlns:a16="http://schemas.microsoft.com/office/drawing/2014/main" id="{569DBF55-D54D-46FF-A3CE-C841C1440EF2}"/>
+              </a:ext>
+            </a:extLst>
+          </p:cNvPr>
+          <p:cNvSpPr txBox="1">
+            <a:spLocks/>
+          </p:cNvSpPr>
+          <p:nvPr/>
+        </p:nvSpPr>
+        <p:spPr>
+          <a:xfrm>
+            <a:off x="838200" y="1920998"/>
+            <a:ext cx="10515600" cy="4351338"/>
+          </a:xfrm>
+          <a:prstGeom prst="rect">
+            <a:avLst/>
+          </a:prstGeom>
+        </p:spPr>
+        <p:txBody>
+          <a:bodyPr vert="horz" lIns="91440" tIns="45720" rIns="91440" bIns="45720" rtlCol="0">
+            <a:normAutofit/>
+          </a:bodyPr>
+          <a:lstStyle>
+            <a:lvl1pPr marL="228600" indent="-228600" algn="l" defTabSz="914400" rtl="0" eaLnBrk="1" latinLnBrk="0" hangingPunct="1">
+              <a:lnSpc>
+                <a:spcPct val="90000"/>
+              </a:lnSpc>
+              <a:spcBef>
+                <a:spcPts val="1000"/>
+              </a:spcBef>
+              <a:buFont typeface="Arial" panose="020B0604020202020204" pitchFamily="34" charset="0"/>
+              <a:buChar char="•"/>
+              <a:defRPr sz="2800" kern="1200">
+                <a:solidFill>
+                  <a:schemeClr val="tx1"/>
+                </a:solidFill>
+                <a:latin typeface="+mn-lt"/>
+                <a:ea typeface="+mn-ea"/>
+                <a:cs typeface="+mn-cs"/>
+              </a:defRPr>
+            </a:lvl1pPr>
+            <a:lvl2pPr marL="685800" indent="-228600" algn="l" defTabSz="914400" rtl="0" eaLnBrk="1" latinLnBrk="0" hangingPunct="1">
+              <a:lnSpc>
+                <a:spcPct val="90000"/>
+              </a:lnSpc>
+              <a:spcBef>
+                <a:spcPts val="500"/>
+              </a:spcBef>
+              <a:buFont typeface="Arial" panose="020B0604020202020204" pitchFamily="34" charset="0"/>
+              <a:buChar char="•"/>
+              <a:defRPr sz="2400" kern="1200">
+                <a:solidFill>
+                  <a:schemeClr val="tx1"/>
+                </a:solidFill>
+                <a:latin typeface="+mn-lt"/>
+                <a:ea typeface="+mn-ea"/>
+                <a:cs typeface="+mn-cs"/>
+              </a:defRPr>
+            </a:lvl2pPr>
+            <a:lvl3pPr marL="1143000" indent="-228600" algn="l" defTabSz="914400" rtl="0" eaLnBrk="1" latinLnBrk="0" hangingPunct="1">
+              <a:lnSpc>
+                <a:spcPct val="90000"/>
+              </a:lnSpc>
+              <a:spcBef>
+                <a:spcPts val="500"/>
+              </a:spcBef>
+              <a:buFont typeface="Arial" panose="020B0604020202020204" pitchFamily="34" charset="0"/>
+              <a:buChar char="•"/>
+              <a:defRPr sz="2000" kern="1200">
+                <a:solidFill>
+                  <a:schemeClr val="tx1"/>
+                </a:solidFill>
+                <a:latin typeface="+mn-lt"/>
+                <a:ea typeface="+mn-ea"/>
+                <a:cs typeface="+mn-cs"/>
+              </a:defRPr>
+            </a:lvl3pPr>
+            <a:lvl4pPr marL="1600200" indent="-228600" algn="l" defTabSz="914400" rtl="0" eaLnBrk="1" latinLnBrk="0" hangingPunct="1">
+              <a:lnSpc>
+                <a:spcPct val="90000"/>
+              </a:lnSpc>
+              <a:spcBef>
+                <a:spcPts val="500"/>
+              </a:spcBef>
+              <a:buFont typeface="Arial" panose="020B0604020202020204" pitchFamily="34" charset="0"/>
+              <a:buChar char="•"/>
+              <a:defRPr sz="1800" kern="1200">
+                <a:solidFill>
+                  <a:schemeClr val="tx1"/>
+                </a:solidFill>
+                <a:latin typeface="+mn-lt"/>
+                <a:ea typeface="+mn-ea"/>
+                <a:cs typeface="+mn-cs"/>
+              </a:defRPr>
+            </a:lvl4pPr>
+            <a:lvl5pPr marL="2057400" indent="-228600" algn="l" defTabSz="914400" rtl="0" eaLnBrk="1" latinLnBrk="0" hangingPunct="1">
+              <a:lnSpc>
+                <a:spcPct val="90000"/>
+              </a:lnSpc>
+              <a:spcBef>
+                <a:spcPts val="500"/>
+              </a:spcBef>
+              <a:buFont typeface="Arial" panose="020B0604020202020204" pitchFamily="34" charset="0"/>
+              <a:buChar char="•"/>
+              <a:defRPr sz="1800" kern="1200">
+                <a:solidFill>
+                  <a:schemeClr val="tx1"/>
+                </a:solidFill>
+                <a:latin typeface="+mn-lt"/>
+                <a:ea typeface="+mn-ea"/>
+                <a:cs typeface="+mn-cs"/>
+              </a:defRPr>
+            </a:lvl5pPr>
+            <a:lvl6pPr marL="2514600" indent="-228600" algn="l" defTabSz="914400" rtl="0" eaLnBrk="1" latinLnBrk="0" hangingPunct="1">
+              <a:lnSpc>
+                <a:spcPct val="90000"/>
+              </a:lnSpc>
+              <a:spcBef>
+                <a:spcPts val="500"/>
+              </a:spcBef>
+              <a:buFont typeface="Arial" panose="020B0604020202020204" pitchFamily="34" charset="0"/>
+              <a:buChar char="•"/>
+              <a:defRPr sz="1800" kern="1200">
+                <a:solidFill>
+                  <a:schemeClr val="tx1"/>
+                </a:solidFill>
+                <a:latin typeface="+mn-lt"/>
+                <a:ea typeface="+mn-ea"/>
+                <a:cs typeface="+mn-cs"/>
+              </a:defRPr>
+            </a:lvl6pPr>
+            <a:lvl7pPr marL="2971800" indent="-228600" algn="l" defTabSz="914400" rtl="0" eaLnBrk="1" latinLnBrk="0" hangingPunct="1">
+              <a:lnSpc>
+                <a:spcPct val="90000"/>
+              </a:lnSpc>
+              <a:spcBef>
+                <a:spcPts val="500"/>
+              </a:spcBef>
+              <a:buFont typeface="Arial" panose="020B0604020202020204" pitchFamily="34" charset="0"/>
+              <a:buChar char="•"/>
+              <a:defRPr sz="1800" kern="1200">
+                <a:solidFill>
+                  <a:schemeClr val="tx1"/>
+                </a:solidFill>
+                <a:latin typeface="+mn-lt"/>
+                <a:ea typeface="+mn-ea"/>
+                <a:cs typeface="+mn-cs"/>
+              </a:defRPr>
+            </a:lvl7pPr>
+            <a:lvl8pPr marL="3429000" indent="-228600" algn="l" defTabSz="914400" rtl="0" eaLnBrk="1" latinLnBrk="0" hangingPunct="1">
+              <a:lnSpc>
+                <a:spcPct val="90000"/>
+              </a:lnSpc>
+              <a:spcBef>
+                <a:spcPts val="500"/>
+              </a:spcBef>
+              <a:buFont typeface="Arial" panose="020B0604020202020204" pitchFamily="34" charset="0"/>
+              <a:buChar char="•"/>
+              <a:defRPr sz="1800" kern="1200">
+                <a:solidFill>
+                  <a:schemeClr val="tx1"/>
+                </a:solidFill>
+                <a:latin typeface="+mn-lt"/>
+                <a:ea typeface="+mn-ea"/>
+                <a:cs typeface="+mn-cs"/>
+              </a:defRPr>
+            </a:lvl8pPr>
+            <a:lvl9pPr marL="3886200" indent="-228600" algn="l" defTabSz="914400" rtl="0" eaLnBrk="1" latinLnBrk="0" hangingPunct="1">
+              <a:lnSpc>
+                <a:spcPct val="90000"/>
+              </a:lnSpc>
+              <a:spcBef>
+                <a:spcPts val="500"/>
+              </a:spcBef>
+              <a:buFont typeface="Arial" panose="020B0604020202020204" pitchFamily="34" charset="0"/>
+              <a:buChar char="•"/>
+              <a:defRPr sz="1800" kern="1200">
+                <a:solidFill>
+                  <a:schemeClr val="tx1"/>
+                </a:solidFill>
+                <a:latin typeface="+mn-lt"/>
+                <a:ea typeface="+mn-ea"/>
+                <a:cs typeface="+mn-cs"/>
+              </a:defRPr>
+            </a:lvl9pPr>
+          </a:lstStyle>
+          <a:p>
+            <a:r>
+              <a:rPr lang="en-US" dirty="0"/>
+              <a:t>Recherche</a:t>
+            </a:r>
+          </a:p>
+          <a:p>
+            <a:r>
+              <a:rPr lang="en-US" dirty="0"/>
+              <a:t>3 </a:t>
+            </a:r>
+            <a:r>
+              <a:rPr lang="en-US" dirty="0" err="1"/>
+              <a:t>Personnes</a:t>
+            </a:r>
+            <a:endParaRPr lang="en-US" dirty="0"/>
+          </a:p>
+          <a:p>
+            <a:r>
+              <a:rPr lang="en-US" dirty="0"/>
+              <a:t>4 </a:t>
+            </a:r>
+            <a:r>
+              <a:rPr lang="en-US" dirty="0" err="1"/>
+              <a:t>Encadrants</a:t>
+            </a:r>
+            <a:endParaRPr lang="en-US" dirty="0"/>
+          </a:p>
+          <a:p>
+            <a:endParaRPr lang="fr-FR" dirty="0"/>
+          </a:p>
+        </p:txBody>
+      </p:sp>
     </p:spTree>
     <p:extLst>
       <p:ext uri="{BB962C8B-B14F-4D97-AF65-F5344CB8AC3E}">
-        <p14:creationId xmlns:p14="http://schemas.microsoft.com/office/powerpoint/2010/main" val="1625049598"/>
+        <p14:creationId xmlns:p14="http://schemas.microsoft.com/office/powerpoint/2010/main" val="3286610782"/>
       </p:ext>
     </p:extLst>
   </p:cSld>
@@ -4322,10 +5433,59 @@
       </p:grpSpPr>
       <p:sp>
         <p:nvSpPr>
+          <p:cNvPr id="3" name="Rectangle 2">
+            <a:extLst>
+              <a:ext uri="{FF2B5EF4-FFF2-40B4-BE49-F238E27FC236}">
+                <a16:creationId xmlns:a16="http://schemas.microsoft.com/office/drawing/2014/main" id="{06DB10D7-3877-463A-B5F1-D65449C78F8A}"/>
+              </a:ext>
+            </a:extLst>
+          </p:cNvPr>
+          <p:cNvSpPr/>
+          <p:nvPr/>
+        </p:nvSpPr>
+        <p:spPr>
+          <a:xfrm>
+            <a:off x="6491046" y="1447833"/>
+            <a:ext cx="2089084" cy="4795228"/>
+          </a:xfrm>
+          <a:prstGeom prst="rect">
+            <a:avLst/>
+          </a:prstGeom>
+          <a:solidFill>
+            <a:srgbClr val="00B0F0"/>
+          </a:solidFill>
+        </p:spPr>
+        <p:style>
+          <a:lnRef idx="2">
+            <a:schemeClr val="accent1">
+              <a:shade val="50000"/>
+            </a:schemeClr>
+          </a:lnRef>
+          <a:fillRef idx="1">
+            <a:schemeClr val="accent1"/>
+          </a:fillRef>
+          <a:effectRef idx="0">
+            <a:schemeClr val="accent1"/>
+          </a:effectRef>
+          <a:fontRef idx="minor">
+            <a:schemeClr val="lt1"/>
+          </a:fontRef>
+        </p:style>
+        <p:txBody>
+          <a:bodyPr rtlCol="0" anchor="ctr"/>
+          <a:lstStyle/>
+          <a:p>
+            <a:pPr algn="ctr"/>
+            <a:endParaRPr lang="fr-FR"/>
+          </a:p>
+        </p:txBody>
+      </p:sp>
+      <p:sp>
+        <p:nvSpPr>
           <p:cNvPr id="2" name="Title 1">
             <a:extLst>
               <a:ext uri="{FF2B5EF4-FFF2-40B4-BE49-F238E27FC236}">
-                <a16:creationId xmlns:a16="http://schemas.microsoft.com/office/drawing/2014/main" id="{5E63459A-791F-4B08-910F-7F1517CE8DE7}"/>
+                <a16:creationId xmlns:a16="http://schemas.microsoft.com/office/drawing/2014/main" id="{DB5E7626-5C07-4D1C-A480-13C7FBF6606E}"/>
               </a:ext>
             </a:extLst>
           </p:cNvPr>
@@ -4336,26 +5496,39 @@
             <p:ph type="title"/>
           </p:nvPr>
         </p:nvSpPr>
-        <p:spPr/>
+        <p:spPr>
+          <a:xfrm>
+            <a:off x="838200" y="365125"/>
+            <a:ext cx="10515600" cy="1325563"/>
+          </a:xfrm>
+        </p:spPr>
         <p:txBody>
           <a:bodyPr/>
           <a:lstStyle/>
           <a:p>
             <a:pPr algn="ctr"/>
             <a:r>
-              <a:rPr lang="en-US" dirty="0" err="1"/>
-              <a:t>Origine</a:t>
-            </a:r>
-            <a:endParaRPr lang="fr-FR" dirty="0"/>
+              <a:rPr lang="en-US" dirty="0">
+                <a:solidFill>
+                  <a:srgbClr val="FF0000"/>
+                </a:solidFill>
+              </a:rPr>
+              <a:t>GENERALITE</a:t>
+            </a:r>
+            <a:endParaRPr lang="fr-FR" dirty="0">
+              <a:solidFill>
+                <a:srgbClr val="FF0000"/>
+              </a:solidFill>
+            </a:endParaRPr>
           </a:p>
         </p:txBody>
       </p:sp>
       <p:pic>
         <p:nvPicPr>
-          <p:cNvPr id="4" name="Content Placeholder 3">
-            <a:extLst>
-              <a:ext uri="{FF2B5EF4-FFF2-40B4-BE49-F238E27FC236}">
-                <a16:creationId xmlns:a16="http://schemas.microsoft.com/office/drawing/2014/main" id="{E3FE7829-125B-4F1E-8C8B-8480C9695999}"/>
+          <p:cNvPr id="6" name="Content Placeholder 5">
+            <a:extLst>
+              <a:ext uri="{FF2B5EF4-FFF2-40B4-BE49-F238E27FC236}">
+                <a16:creationId xmlns:a16="http://schemas.microsoft.com/office/drawing/2014/main" id="{E11869FC-DC31-4DDE-9EDC-D36603FC60B6}"/>
               </a:ext>
             </a:extLst>
           </p:cNvPr>
@@ -4374,73 +5547,507 @@
         </p:blipFill>
         <p:spPr>
           <a:xfrm>
-            <a:off x="1062916" y="2087134"/>
-            <a:ext cx="3146794" cy="2850625"/>
+            <a:off x="6588662" y="1759824"/>
+            <a:ext cx="1875793" cy="1568046"/>
           </a:xfrm>
           <a:prstGeom prst="rect">
             <a:avLst/>
           </a:prstGeom>
         </p:spPr>
       </p:pic>
-      <p:sp>
-        <p:nvSpPr>
-          <p:cNvPr id="5" name="TextBox 4">
-            <a:extLst>
-              <a:ext uri="{FF2B5EF4-FFF2-40B4-BE49-F238E27FC236}">
-                <a16:creationId xmlns:a16="http://schemas.microsoft.com/office/drawing/2014/main" id="{A16B9545-BFA1-473D-B714-BE426FCDD1CB}"/>
-              </a:ext>
-            </a:extLst>
-          </p:cNvPr>
-          <p:cNvSpPr txBox="1"/>
+      <p:pic>
+        <p:nvPicPr>
+          <p:cNvPr id="7" name="Picture 6">
+            <a:extLst>
+              <a:ext uri="{FF2B5EF4-FFF2-40B4-BE49-F238E27FC236}">
+                <a16:creationId xmlns:a16="http://schemas.microsoft.com/office/drawing/2014/main" id="{50A3438A-A24E-4CD9-86E2-DAB3925EA04A}"/>
+              </a:ext>
+            </a:extLst>
+          </p:cNvPr>
+          <p:cNvPicPr>
+            <a:picLocks noChangeAspect="1"/>
+          </p:cNvPicPr>
           <p:nvPr/>
-        </p:nvSpPr>
+        </p:nvPicPr>
+        <p:blipFill>
+          <a:blip r:embed="rId3"/>
+          <a:stretch>
+            <a:fillRect/>
+          </a:stretch>
+        </p:blipFill>
         <p:spPr>
           <a:xfrm>
-            <a:off x="5317588" y="2419643"/>
-            <a:ext cx="4459458" cy="369332"/>
+            <a:off x="6652925" y="4675182"/>
+            <a:ext cx="1747269" cy="1486266"/>
           </a:xfrm>
           <a:prstGeom prst="rect">
             <a:avLst/>
           </a:prstGeom>
-          <a:noFill/>
-        </p:spPr>
-        <p:txBody>
-          <a:bodyPr wrap="square" rtlCol="0">
-            <a:spAutoFit/>
+        </p:spPr>
+      </p:pic>
+      <p:pic>
+        <p:nvPicPr>
+          <p:cNvPr id="8" name="Picture 7">
+            <a:extLst>
+              <a:ext uri="{FF2B5EF4-FFF2-40B4-BE49-F238E27FC236}">
+                <a16:creationId xmlns:a16="http://schemas.microsoft.com/office/drawing/2014/main" id="{BE6AEC60-74BD-45B8-877D-3EEC387768BD}"/>
+              </a:ext>
+            </a:extLst>
+          </p:cNvPr>
+          <p:cNvPicPr>
+            <a:picLocks noChangeAspect="1"/>
+          </p:cNvPicPr>
+          <p:nvPr/>
+        </p:nvPicPr>
+        <p:blipFill>
+          <a:blip r:embed="rId4"/>
+          <a:stretch>
+            <a:fillRect/>
+          </a:stretch>
+        </p:blipFill>
+        <p:spPr>
+          <a:xfrm>
+            <a:off x="10023057" y="3845447"/>
+            <a:ext cx="1016460" cy="697448"/>
+          </a:xfrm>
+          <a:prstGeom prst="rect">
+            <a:avLst/>
+          </a:prstGeom>
+        </p:spPr>
+      </p:pic>
+      <p:pic>
+        <p:nvPicPr>
+          <p:cNvPr id="9" name="Picture 8">
+            <a:extLst>
+              <a:ext uri="{FF2B5EF4-FFF2-40B4-BE49-F238E27FC236}">
+                <a16:creationId xmlns:a16="http://schemas.microsoft.com/office/drawing/2014/main" id="{955F07BA-36A7-48FA-94CF-B9C87925C82A}"/>
+              </a:ext>
+            </a:extLst>
+          </p:cNvPr>
+          <p:cNvPicPr>
+            <a:picLocks noChangeAspect="1"/>
+          </p:cNvPicPr>
+          <p:nvPr/>
+        </p:nvPicPr>
+        <p:blipFill>
+          <a:blip r:embed="rId5"/>
+          <a:stretch>
+            <a:fillRect/>
+          </a:stretch>
+        </p:blipFill>
+        <p:spPr>
+          <a:xfrm>
+            <a:off x="3752077" y="5013164"/>
+            <a:ext cx="761729" cy="697448"/>
+          </a:xfrm>
+          <a:prstGeom prst="rect">
+            <a:avLst/>
+          </a:prstGeom>
+        </p:spPr>
+      </p:pic>
+      <p:sp>
+        <p:nvSpPr>
+          <p:cNvPr id="10" name="Arrow: Down 9">
+            <a:extLst>
+              <a:ext uri="{FF2B5EF4-FFF2-40B4-BE49-F238E27FC236}">
+                <a16:creationId xmlns:a16="http://schemas.microsoft.com/office/drawing/2014/main" id="{C22D1135-9F3F-4E68-9F80-4FAD8B8104C8}"/>
+              </a:ext>
+            </a:extLst>
+          </p:cNvPr>
+          <p:cNvSpPr/>
+          <p:nvPr/>
+        </p:nvSpPr>
+        <p:spPr>
+          <a:xfrm rot="16200000">
+            <a:off x="5267590" y="4941844"/>
+            <a:ext cx="631551" cy="1175102"/>
+          </a:xfrm>
+          <a:prstGeom prst="downArrow">
+            <a:avLst/>
+          </a:prstGeom>
+        </p:spPr>
+        <p:style>
+          <a:lnRef idx="2">
+            <a:schemeClr val="accent1">
+              <a:shade val="50000"/>
+            </a:schemeClr>
+          </a:lnRef>
+          <a:fillRef idx="1">
+            <a:schemeClr val="accent1"/>
+          </a:fillRef>
+          <a:effectRef idx="0">
+            <a:schemeClr val="accent1"/>
+          </a:effectRef>
+          <a:fontRef idx="minor">
+            <a:schemeClr val="lt1"/>
+          </a:fontRef>
+        </p:style>
+        <p:txBody>
+          <a:bodyPr rtlCol="0" anchor="ctr"/>
+          <a:lstStyle/>
+          <a:p>
+            <a:pPr algn="ctr"/>
+            <a:endParaRPr lang="fr-FR"/>
+          </a:p>
+        </p:txBody>
+      </p:sp>
+      <p:sp>
+        <p:nvSpPr>
+          <p:cNvPr id="12" name="Arrow: Up-Down 11">
+            <a:extLst>
+              <a:ext uri="{FF2B5EF4-FFF2-40B4-BE49-F238E27FC236}">
+                <a16:creationId xmlns:a16="http://schemas.microsoft.com/office/drawing/2014/main" id="{EA1C6480-C025-4B38-AB18-3BD888E8BCBD}"/>
+              </a:ext>
+            </a:extLst>
+          </p:cNvPr>
+          <p:cNvSpPr/>
+          <p:nvPr/>
+        </p:nvSpPr>
+        <p:spPr>
+          <a:xfrm>
+            <a:off x="7245617" y="3447680"/>
+            <a:ext cx="604911" cy="926788"/>
+          </a:xfrm>
+          <a:prstGeom prst="upDownArrow">
+            <a:avLst/>
+          </a:prstGeom>
+        </p:spPr>
+        <p:style>
+          <a:lnRef idx="2">
+            <a:schemeClr val="accent1">
+              <a:shade val="50000"/>
+            </a:schemeClr>
+          </a:lnRef>
+          <a:fillRef idx="1">
+            <a:schemeClr val="accent1"/>
+          </a:fillRef>
+          <a:effectRef idx="0">
+            <a:schemeClr val="accent1"/>
+          </a:effectRef>
+          <a:fontRef idx="minor">
+            <a:schemeClr val="lt1"/>
+          </a:fontRef>
+        </p:style>
+        <p:txBody>
+          <a:bodyPr rtlCol="0" anchor="ctr"/>
+          <a:lstStyle/>
+          <a:p>
+            <a:pPr algn="ctr"/>
+            <a:endParaRPr lang="fr-FR"/>
+          </a:p>
+        </p:txBody>
+      </p:sp>
+      <p:sp>
+        <p:nvSpPr>
+          <p:cNvPr id="13" name="Arrow: Right 12">
+            <a:extLst>
+              <a:ext uri="{FF2B5EF4-FFF2-40B4-BE49-F238E27FC236}">
+                <a16:creationId xmlns:a16="http://schemas.microsoft.com/office/drawing/2014/main" id="{B827C765-99DF-4224-9D2A-D454F7AA7D28}"/>
+              </a:ext>
+            </a:extLst>
+          </p:cNvPr>
+          <p:cNvSpPr/>
+          <p:nvPr/>
+        </p:nvSpPr>
+        <p:spPr>
+          <a:xfrm rot="13153555">
+            <a:off x="8568803" y="2758436"/>
+            <a:ext cx="1083212" cy="645401"/>
+          </a:xfrm>
+          <a:prstGeom prst="rightArrow">
+            <a:avLst/>
+          </a:prstGeom>
+        </p:spPr>
+        <p:style>
+          <a:lnRef idx="2">
+            <a:schemeClr val="accent1">
+              <a:shade val="50000"/>
+            </a:schemeClr>
+          </a:lnRef>
+          <a:fillRef idx="1">
+            <a:schemeClr val="accent1"/>
+          </a:fillRef>
+          <a:effectRef idx="0">
+            <a:schemeClr val="accent1"/>
+          </a:effectRef>
+          <a:fontRef idx="minor">
+            <a:schemeClr val="lt1"/>
+          </a:fontRef>
+        </p:style>
+        <p:txBody>
+          <a:bodyPr rtlCol="0" anchor="ctr"/>
+          <a:lstStyle/>
+          <a:p>
+            <a:pPr algn="ctr"/>
+            <a:endParaRPr lang="fr-FR"/>
+          </a:p>
+        </p:txBody>
+      </p:sp>
+      <p:sp>
+        <p:nvSpPr>
+          <p:cNvPr id="14" name="Arrow: Down 13">
+            <a:extLst>
+              <a:ext uri="{FF2B5EF4-FFF2-40B4-BE49-F238E27FC236}">
+                <a16:creationId xmlns:a16="http://schemas.microsoft.com/office/drawing/2014/main" id="{1971E3EE-7DC3-491F-9B5B-D2677C3BE5F9}"/>
+              </a:ext>
+            </a:extLst>
+          </p:cNvPr>
+          <p:cNvSpPr/>
+          <p:nvPr/>
+        </p:nvSpPr>
+        <p:spPr>
+          <a:xfrm rot="14567114">
+            <a:off x="8967637" y="4385426"/>
+            <a:ext cx="631551" cy="1175102"/>
+          </a:xfrm>
+          <a:prstGeom prst="downArrow">
+            <a:avLst/>
+          </a:prstGeom>
+        </p:spPr>
+        <p:style>
+          <a:lnRef idx="2">
+            <a:schemeClr val="accent1">
+              <a:shade val="50000"/>
+            </a:schemeClr>
+          </a:lnRef>
+          <a:fillRef idx="1">
+            <a:schemeClr val="accent1"/>
+          </a:fillRef>
+          <a:effectRef idx="0">
+            <a:schemeClr val="accent1"/>
+          </a:effectRef>
+          <a:fontRef idx="minor">
+            <a:schemeClr val="lt1"/>
+          </a:fontRef>
+        </p:style>
+        <p:txBody>
+          <a:bodyPr rtlCol="0" anchor="ctr"/>
+          <a:lstStyle/>
+          <a:p>
+            <a:pPr algn="ctr"/>
+            <a:endParaRPr lang="fr-FR"/>
+          </a:p>
+        </p:txBody>
+      </p:sp>
+      <p:sp>
+        <p:nvSpPr>
+          <p:cNvPr id="16" name="Content Placeholder 2">
+            <a:extLst>
+              <a:ext uri="{FF2B5EF4-FFF2-40B4-BE49-F238E27FC236}">
+                <a16:creationId xmlns:a16="http://schemas.microsoft.com/office/drawing/2014/main" id="{569DBF55-D54D-46FF-A3CE-C841C1440EF2}"/>
+              </a:ext>
+            </a:extLst>
+          </p:cNvPr>
+          <p:cNvSpPr txBox="1">
+            <a:spLocks/>
+          </p:cNvSpPr>
+          <p:nvPr/>
+        </p:nvSpPr>
+        <p:spPr>
+          <a:xfrm>
+            <a:off x="838200" y="1920998"/>
+            <a:ext cx="10515600" cy="4351338"/>
+          </a:xfrm>
+          <a:prstGeom prst="rect">
+            <a:avLst/>
+          </a:prstGeom>
+        </p:spPr>
+        <p:txBody>
+          <a:bodyPr vert="horz" lIns="91440" tIns="45720" rIns="91440" bIns="45720" rtlCol="0">
+            <a:normAutofit/>
           </a:bodyPr>
-          <a:lstStyle/>
-          <a:p>
-            <a:r>
-              <a:rPr lang="en-US" dirty="0" err="1"/>
-              <a:t>originSource</a:t>
-            </a:r>
-            <a:r>
-              <a:rPr lang="en-US" dirty="0"/>
-              <a:t>: nom de </a:t>
-            </a:r>
-            <a:r>
-              <a:rPr lang="en-US" dirty="0" err="1"/>
-              <a:t>l’origine</a:t>
-            </a:r>
-            <a:r>
-              <a:rPr lang="en-US" dirty="0"/>
-              <a:t> ( EX: </a:t>
-            </a:r>
-            <a:r>
-              <a:rPr lang="en-US" dirty="0" err="1"/>
-              <a:t>wikopaco</a:t>
-            </a:r>
-            <a:r>
-              <a:rPr lang="en-US" dirty="0"/>
-              <a:t>)</a:t>
-            </a:r>
+          <a:lstStyle>
+            <a:lvl1pPr marL="228600" indent="-228600" algn="l" defTabSz="914400" rtl="0" eaLnBrk="1" latinLnBrk="0" hangingPunct="1">
+              <a:lnSpc>
+                <a:spcPct val="90000"/>
+              </a:lnSpc>
+              <a:spcBef>
+                <a:spcPts val="1000"/>
+              </a:spcBef>
+              <a:buFont typeface="Arial" panose="020B0604020202020204" pitchFamily="34" charset="0"/>
+              <a:buChar char="•"/>
+              <a:defRPr sz="2800" kern="1200">
+                <a:solidFill>
+                  <a:schemeClr val="tx1"/>
+                </a:solidFill>
+                <a:latin typeface="+mn-lt"/>
+                <a:ea typeface="+mn-ea"/>
+                <a:cs typeface="+mn-cs"/>
+              </a:defRPr>
+            </a:lvl1pPr>
+            <a:lvl2pPr marL="685800" indent="-228600" algn="l" defTabSz="914400" rtl="0" eaLnBrk="1" latinLnBrk="0" hangingPunct="1">
+              <a:lnSpc>
+                <a:spcPct val="90000"/>
+              </a:lnSpc>
+              <a:spcBef>
+                <a:spcPts val="500"/>
+              </a:spcBef>
+              <a:buFont typeface="Arial" panose="020B0604020202020204" pitchFamily="34" charset="0"/>
+              <a:buChar char="•"/>
+              <a:defRPr sz="2400" kern="1200">
+                <a:solidFill>
+                  <a:schemeClr val="tx1"/>
+                </a:solidFill>
+                <a:latin typeface="+mn-lt"/>
+                <a:ea typeface="+mn-ea"/>
+                <a:cs typeface="+mn-cs"/>
+              </a:defRPr>
+            </a:lvl2pPr>
+            <a:lvl3pPr marL="1143000" indent="-228600" algn="l" defTabSz="914400" rtl="0" eaLnBrk="1" latinLnBrk="0" hangingPunct="1">
+              <a:lnSpc>
+                <a:spcPct val="90000"/>
+              </a:lnSpc>
+              <a:spcBef>
+                <a:spcPts val="500"/>
+              </a:spcBef>
+              <a:buFont typeface="Arial" panose="020B0604020202020204" pitchFamily="34" charset="0"/>
+              <a:buChar char="•"/>
+              <a:defRPr sz="2000" kern="1200">
+                <a:solidFill>
+                  <a:schemeClr val="tx1"/>
+                </a:solidFill>
+                <a:latin typeface="+mn-lt"/>
+                <a:ea typeface="+mn-ea"/>
+                <a:cs typeface="+mn-cs"/>
+              </a:defRPr>
+            </a:lvl3pPr>
+            <a:lvl4pPr marL="1600200" indent="-228600" algn="l" defTabSz="914400" rtl="0" eaLnBrk="1" latinLnBrk="0" hangingPunct="1">
+              <a:lnSpc>
+                <a:spcPct val="90000"/>
+              </a:lnSpc>
+              <a:spcBef>
+                <a:spcPts val="500"/>
+              </a:spcBef>
+              <a:buFont typeface="Arial" panose="020B0604020202020204" pitchFamily="34" charset="0"/>
+              <a:buChar char="•"/>
+              <a:defRPr sz="1800" kern="1200">
+                <a:solidFill>
+                  <a:schemeClr val="tx1"/>
+                </a:solidFill>
+                <a:latin typeface="+mn-lt"/>
+                <a:ea typeface="+mn-ea"/>
+                <a:cs typeface="+mn-cs"/>
+              </a:defRPr>
+            </a:lvl4pPr>
+            <a:lvl5pPr marL="2057400" indent="-228600" algn="l" defTabSz="914400" rtl="0" eaLnBrk="1" latinLnBrk="0" hangingPunct="1">
+              <a:lnSpc>
+                <a:spcPct val="90000"/>
+              </a:lnSpc>
+              <a:spcBef>
+                <a:spcPts val="500"/>
+              </a:spcBef>
+              <a:buFont typeface="Arial" panose="020B0604020202020204" pitchFamily="34" charset="0"/>
+              <a:buChar char="•"/>
+              <a:defRPr sz="1800" kern="1200">
+                <a:solidFill>
+                  <a:schemeClr val="tx1"/>
+                </a:solidFill>
+                <a:latin typeface="+mn-lt"/>
+                <a:ea typeface="+mn-ea"/>
+                <a:cs typeface="+mn-cs"/>
+              </a:defRPr>
+            </a:lvl5pPr>
+            <a:lvl6pPr marL="2514600" indent="-228600" algn="l" defTabSz="914400" rtl="0" eaLnBrk="1" latinLnBrk="0" hangingPunct="1">
+              <a:lnSpc>
+                <a:spcPct val="90000"/>
+              </a:lnSpc>
+              <a:spcBef>
+                <a:spcPts val="500"/>
+              </a:spcBef>
+              <a:buFont typeface="Arial" panose="020B0604020202020204" pitchFamily="34" charset="0"/>
+              <a:buChar char="•"/>
+              <a:defRPr sz="1800" kern="1200">
+                <a:solidFill>
+                  <a:schemeClr val="tx1"/>
+                </a:solidFill>
+                <a:latin typeface="+mn-lt"/>
+                <a:ea typeface="+mn-ea"/>
+                <a:cs typeface="+mn-cs"/>
+              </a:defRPr>
+            </a:lvl6pPr>
+            <a:lvl7pPr marL="2971800" indent="-228600" algn="l" defTabSz="914400" rtl="0" eaLnBrk="1" latinLnBrk="0" hangingPunct="1">
+              <a:lnSpc>
+                <a:spcPct val="90000"/>
+              </a:lnSpc>
+              <a:spcBef>
+                <a:spcPts val="500"/>
+              </a:spcBef>
+              <a:buFont typeface="Arial" panose="020B0604020202020204" pitchFamily="34" charset="0"/>
+              <a:buChar char="•"/>
+              <a:defRPr sz="1800" kern="1200">
+                <a:solidFill>
+                  <a:schemeClr val="tx1"/>
+                </a:solidFill>
+                <a:latin typeface="+mn-lt"/>
+                <a:ea typeface="+mn-ea"/>
+                <a:cs typeface="+mn-cs"/>
+              </a:defRPr>
+            </a:lvl7pPr>
+            <a:lvl8pPr marL="3429000" indent="-228600" algn="l" defTabSz="914400" rtl="0" eaLnBrk="1" latinLnBrk="0" hangingPunct="1">
+              <a:lnSpc>
+                <a:spcPct val="90000"/>
+              </a:lnSpc>
+              <a:spcBef>
+                <a:spcPts val="500"/>
+              </a:spcBef>
+              <a:buFont typeface="Arial" panose="020B0604020202020204" pitchFamily="34" charset="0"/>
+              <a:buChar char="•"/>
+              <a:defRPr sz="1800" kern="1200">
+                <a:solidFill>
+                  <a:schemeClr val="tx1"/>
+                </a:solidFill>
+                <a:latin typeface="+mn-lt"/>
+                <a:ea typeface="+mn-ea"/>
+                <a:cs typeface="+mn-cs"/>
+              </a:defRPr>
+            </a:lvl8pPr>
+            <a:lvl9pPr marL="3886200" indent="-228600" algn="l" defTabSz="914400" rtl="0" eaLnBrk="1" latinLnBrk="0" hangingPunct="1">
+              <a:lnSpc>
+                <a:spcPct val="90000"/>
+              </a:lnSpc>
+              <a:spcBef>
+                <a:spcPts val="500"/>
+              </a:spcBef>
+              <a:buFont typeface="Arial" panose="020B0604020202020204" pitchFamily="34" charset="0"/>
+              <a:buChar char="•"/>
+              <a:defRPr sz="1800" kern="1200">
+                <a:solidFill>
+                  <a:schemeClr val="tx1"/>
+                </a:solidFill>
+                <a:latin typeface="+mn-lt"/>
+                <a:ea typeface="+mn-ea"/>
+                <a:cs typeface="+mn-cs"/>
+              </a:defRPr>
+            </a:lvl9pPr>
+          </a:lstStyle>
+          <a:p>
+            <a:r>
+              <a:rPr lang="fr-FR" dirty="0"/>
+              <a:t>Un moteur d'inférences</a:t>
+            </a:r>
+          </a:p>
+          <a:p>
+            <a:r>
+              <a:rPr lang="fr-FR" dirty="0"/>
+              <a:t>Acquisition semi-automatique de cas</a:t>
+            </a:r>
+          </a:p>
+          <a:p>
+            <a:r>
+              <a:rPr lang="fr-FR" dirty="0"/>
+              <a:t>Une infrastructure Web</a:t>
+            </a:r>
+            <a:endParaRPr lang="en-US" dirty="0"/>
+          </a:p>
+          <a:p>
+            <a:endParaRPr lang="fr-FR" dirty="0"/>
           </a:p>
         </p:txBody>
       </p:sp>
     </p:spTree>
     <p:extLst>
       <p:ext uri="{BB962C8B-B14F-4D97-AF65-F5344CB8AC3E}">
-        <p14:creationId xmlns:p14="http://schemas.microsoft.com/office/powerpoint/2010/main" val="4077914320"/>
+        <p14:creationId xmlns:p14="http://schemas.microsoft.com/office/powerpoint/2010/main" val="3323050231"/>
       </p:ext>
     </p:extLst>
   </p:cSld>
@@ -4467,83 +6074,120 @@
           <a:chExt cx="0" cy="0"/>
         </a:xfrm>
       </p:grpSpPr>
+      <p:pic>
+        <p:nvPicPr>
+          <p:cNvPr id="5" name="Picture 4">
+            <a:extLst>
+              <a:ext uri="{FF2B5EF4-FFF2-40B4-BE49-F238E27FC236}">
+                <a16:creationId xmlns:a16="http://schemas.microsoft.com/office/drawing/2014/main" id="{749CB5E5-0423-4DD5-9D35-BD0B7BB2AB1F}"/>
+              </a:ext>
+            </a:extLst>
+          </p:cNvPr>
+          <p:cNvPicPr>
+            <a:picLocks noChangeAspect="1"/>
+          </p:cNvPicPr>
+          <p:nvPr/>
+        </p:nvPicPr>
+        <p:blipFill>
+          <a:blip r:embed="rId3">
+            <a:extLst>
+              <a:ext uri="{28A0092B-C50C-407E-A947-70E740481C1C}">
+                <a14:useLocalDpi xmlns:a14="http://schemas.microsoft.com/office/drawing/2010/main" val="0"/>
+              </a:ext>
+            </a:extLst>
+          </a:blip>
+          <a:stretch>
+            <a:fillRect/>
+          </a:stretch>
+        </p:blipFill>
+        <p:spPr>
+          <a:xfrm>
+            <a:off x="5083838" y="2941459"/>
+            <a:ext cx="2024324" cy="809730"/>
+          </a:xfrm>
+          <a:prstGeom prst="rect">
+            <a:avLst/>
+          </a:prstGeom>
+        </p:spPr>
+      </p:pic>
       <p:sp>
         <p:nvSpPr>
           <p:cNvPr id="2" name="Title 1">
             <a:extLst>
               <a:ext uri="{FF2B5EF4-FFF2-40B4-BE49-F238E27FC236}">
-                <a16:creationId xmlns:a16="http://schemas.microsoft.com/office/drawing/2014/main" id="{EE413DB9-A7D8-4695-84CE-D8B925D44811}"/>
-              </a:ext>
-            </a:extLst>
-          </p:cNvPr>
-          <p:cNvSpPr>
-            <a:spLocks noGrp="1"/>
-          </p:cNvSpPr>
-          <p:nvPr>
-            <p:ph type="title"/>
-          </p:nvPr>
-        </p:nvSpPr>
-        <p:spPr/>
+                <a16:creationId xmlns:a16="http://schemas.microsoft.com/office/drawing/2014/main" id="{098EB305-D5AF-4CDE-8F84-7DB4398C3831}"/>
+              </a:ext>
+            </a:extLst>
+          </p:cNvPr>
+          <p:cNvSpPr>
+            <a:spLocks noGrp="1"/>
+          </p:cNvSpPr>
+          <p:nvPr>
+            <p:ph type="ctrTitle"/>
+          </p:nvPr>
+        </p:nvSpPr>
+        <p:spPr>
+          <a:xfrm>
+            <a:off x="1524000" y="928467"/>
+            <a:ext cx="9144000" cy="1371674"/>
+          </a:xfrm>
+        </p:spPr>
         <p:txBody>
           <a:bodyPr/>
           <a:lstStyle/>
           <a:p>
-            <a:pPr algn="ctr"/>
-            <a:r>
-              <a:rPr lang="en-US" dirty="0">
-                <a:solidFill>
-                  <a:srgbClr val="FF0000"/>
-                </a:solidFill>
-              </a:rPr>
-              <a:t>Interface web </a:t>
-            </a:r>
             <a:r>
               <a:rPr lang="fr-FR" dirty="0">
                 <a:solidFill>
                   <a:srgbClr val="FF0000"/>
                 </a:solidFill>
               </a:rPr>
-              <a:t>multilingue</a:t>
-            </a:r>
-          </a:p>
-        </p:txBody>
-      </p:sp>
-      <p:pic>
-        <p:nvPicPr>
-          <p:cNvPr id="6" name="Content Placeholder 5">
-            <a:extLst>
-              <a:ext uri="{FF2B5EF4-FFF2-40B4-BE49-F238E27FC236}">
-                <a16:creationId xmlns:a16="http://schemas.microsoft.com/office/drawing/2014/main" id="{491758AA-983A-4470-991A-60619C402BF2}"/>
-              </a:ext>
-            </a:extLst>
-          </p:cNvPr>
-          <p:cNvPicPr>
-            <a:picLocks noGrp="1" noChangeAspect="1"/>
-          </p:cNvPicPr>
-          <p:nvPr>
-            <p:ph idx="1"/>
-          </p:nvPr>
-        </p:nvPicPr>
-        <p:blipFill>
-          <a:blip r:embed="rId2"/>
-          <a:stretch>
-            <a:fillRect/>
-          </a:stretch>
-        </p:blipFill>
+              <a:t>CORRECTOR</a:t>
+            </a:r>
+          </a:p>
+        </p:txBody>
+      </p:sp>
+      <p:sp>
+        <p:nvSpPr>
+          <p:cNvPr id="3" name="Subtitle 2">
+            <a:extLst>
+              <a:ext uri="{FF2B5EF4-FFF2-40B4-BE49-F238E27FC236}">
+                <a16:creationId xmlns:a16="http://schemas.microsoft.com/office/drawing/2014/main" id="{B6F05377-FAFD-4DAF-B1A2-3AC2AA1406F7}"/>
+              </a:ext>
+            </a:extLst>
+          </p:cNvPr>
+          <p:cNvSpPr>
+            <a:spLocks noGrp="1"/>
+          </p:cNvSpPr>
+          <p:nvPr>
+            <p:ph type="subTitle" idx="1"/>
+          </p:nvPr>
+        </p:nvSpPr>
         <p:spPr>
           <a:xfrm>
-            <a:off x="3833812" y="2357132"/>
-            <a:ext cx="4524375" cy="1600200"/>
-          </a:xfrm>
-          <a:prstGeom prst="rect">
-            <a:avLst/>
-          </a:prstGeom>
-        </p:spPr>
-      </p:pic>
+            <a:off x="1524000" y="5202238"/>
+            <a:ext cx="9144000" cy="1655762"/>
+          </a:xfrm>
+        </p:spPr>
+        <p:txBody>
+          <a:bodyPr/>
+          <a:lstStyle/>
+          <a:p>
+            <a:r>
+              <a:rPr lang="en-US" dirty="0"/>
+              <a:t>Interface web et Base de </a:t>
+            </a:r>
+            <a:r>
+              <a:rPr lang="fr-FR" dirty="0"/>
+              <a:t>données</a:t>
+            </a:r>
+          </a:p>
+        </p:txBody>
+      </p:sp>
     </p:spTree>
     <p:extLst>
       <p:ext uri="{BB962C8B-B14F-4D97-AF65-F5344CB8AC3E}">
-        <p14:creationId xmlns:p14="http://schemas.microsoft.com/office/powerpoint/2010/main" val="3631094681"/>
+        <p14:creationId xmlns:p14="http://schemas.microsoft.com/office/powerpoint/2010/main" val="1137366925"/>
       </p:ext>
     </p:extLst>
   </p:cSld>
@@ -4575,7 +6219,7 @@
           <p:cNvPr id="2" name="Title 1">
             <a:extLst>
               <a:ext uri="{FF2B5EF4-FFF2-40B4-BE49-F238E27FC236}">
-                <a16:creationId xmlns:a16="http://schemas.microsoft.com/office/drawing/2014/main" id="{C52469D6-501C-48AC-8F65-DF428263330A}"/>
+                <a16:creationId xmlns:a16="http://schemas.microsoft.com/office/drawing/2014/main" id="{ECDCC142-4404-43ED-872E-DB617DED987F}"/>
               </a:ext>
             </a:extLst>
           </p:cNvPr>
@@ -4593,54 +6237,111 @@
           <a:p>
             <a:pPr algn="ctr"/>
             <a:r>
-              <a:rPr lang="fr-FR">
+              <a:rPr lang="en-US" dirty="0">
                 <a:solidFill>
                   <a:srgbClr val="FF0000"/>
                 </a:solidFill>
               </a:rPr>
-              <a:t>Formulaire de verification</a:t>
-            </a:r>
+              <a:t>BASE DE </a:t>
+            </a:r>
+            <a:r>
+              <a:rPr lang="fr-FR" dirty="0">
+                <a:solidFill>
+                  <a:srgbClr val="FF0000"/>
+                </a:solidFill>
+              </a:rPr>
+              <a:t>DONNÉES</a:t>
+            </a:r>
+          </a:p>
+        </p:txBody>
+      </p:sp>
+      <p:sp>
+        <p:nvSpPr>
+          <p:cNvPr id="4" name="Content Placeholder 3">
+            <a:extLst>
+              <a:ext uri="{FF2B5EF4-FFF2-40B4-BE49-F238E27FC236}">
+                <a16:creationId xmlns:a16="http://schemas.microsoft.com/office/drawing/2014/main" id="{41DAD51D-735E-4832-8669-CD472C542697}"/>
+              </a:ext>
+            </a:extLst>
+          </p:cNvPr>
+          <p:cNvSpPr>
+            <a:spLocks noGrp="1"/>
+          </p:cNvSpPr>
+          <p:nvPr>
+            <p:ph idx="1"/>
+          </p:nvPr>
+        </p:nvSpPr>
+        <p:spPr>
+          <a:xfrm>
+            <a:off x="838200" y="1825625"/>
+            <a:ext cx="4873283" cy="4351338"/>
+          </a:xfrm>
+        </p:spPr>
+        <p:txBody>
+          <a:bodyPr/>
+          <a:lstStyle/>
+          <a:p>
+            <a:r>
+              <a:rPr lang="en-US" dirty="0" err="1"/>
+              <a:t>mySQL</a:t>
+            </a:r>
+            <a:endParaRPr lang="en-US" dirty="0"/>
+          </a:p>
+          <a:p>
+            <a:r>
+              <a:rPr lang="fr-FR" dirty="0"/>
+              <a:t>Approvisionner</a:t>
+            </a:r>
+            <a:r>
+              <a:rPr lang="en-US" dirty="0"/>
+              <a:t>:</a:t>
+            </a:r>
+          </a:p>
+          <a:p>
+            <a:pPr lvl="1"/>
+            <a:r>
+              <a:rPr lang="en-US" dirty="0"/>
+              <a:t>Cas minimal(file.csv)</a:t>
+            </a:r>
+          </a:p>
+          <a:p>
+            <a:pPr lvl="1"/>
+            <a:r>
+              <a:rPr lang="fr-FR" dirty="0"/>
+              <a:t>Acquisition semi-automatique de cas(Cf. Mr LEVY)</a:t>
+            </a:r>
+          </a:p>
+          <a:p>
+            <a:pPr lvl="1"/>
+            <a:r>
+              <a:rPr lang="fr-FR" dirty="0"/>
+              <a:t>Utilisateur</a:t>
+            </a:r>
+            <a:endParaRPr lang="en-US" dirty="0"/>
+          </a:p>
+          <a:p>
+            <a:endParaRPr lang="en-US" dirty="0"/>
+          </a:p>
+          <a:p>
+            <a:endParaRPr lang="en-US" dirty="0"/>
+          </a:p>
+          <a:p>
+            <a:endParaRPr lang="en-US" dirty="0"/>
+          </a:p>
+          <a:p>
+            <a:pPr marL="457200" lvl="1" indent="0">
+              <a:buNone/>
+            </a:pPr>
+            <a:endParaRPr lang="fr-FR" dirty="0"/>
           </a:p>
         </p:txBody>
       </p:sp>
       <p:pic>
         <p:nvPicPr>
-          <p:cNvPr id="4" name="Content Placeholder 3">
-            <a:extLst>
-              <a:ext uri="{FF2B5EF4-FFF2-40B4-BE49-F238E27FC236}">
-                <a16:creationId xmlns:a16="http://schemas.microsoft.com/office/drawing/2014/main" id="{AAE0DCE4-F0B3-4BF9-AE4F-F47563A3411F}"/>
-              </a:ext>
-            </a:extLst>
-          </p:cNvPr>
-          <p:cNvPicPr>
-            <a:picLocks noGrp="1" noChangeAspect="1"/>
-          </p:cNvPicPr>
-          <p:nvPr>
-            <p:ph idx="1"/>
-          </p:nvPr>
-        </p:nvPicPr>
-        <p:blipFill>
-          <a:blip r:embed="rId2"/>
-          <a:stretch>
-            <a:fillRect/>
-          </a:stretch>
-        </p:blipFill>
-        <p:spPr>
-          <a:xfrm>
-            <a:off x="1000125" y="1916930"/>
-            <a:ext cx="10191750" cy="1524000"/>
-          </a:xfrm>
-          <a:prstGeom prst="rect">
-            <a:avLst/>
-          </a:prstGeom>
-        </p:spPr>
-      </p:pic>
-      <p:pic>
-        <p:nvPicPr>
-          <p:cNvPr id="5" name="Picture 4">
-            <a:extLst>
-              <a:ext uri="{FF2B5EF4-FFF2-40B4-BE49-F238E27FC236}">
-                <a16:creationId xmlns:a16="http://schemas.microsoft.com/office/drawing/2014/main" id="{92E7BC5F-0B72-4902-9988-108303948991}"/>
+          <p:cNvPr id="7" name="Content Placeholder 10">
+            <a:extLst>
+              <a:ext uri="{FF2B5EF4-FFF2-40B4-BE49-F238E27FC236}">
+                <a16:creationId xmlns:a16="http://schemas.microsoft.com/office/drawing/2014/main" id="{0EC585E5-ACB6-4548-BF29-C32775DCD7DF}"/>
               </a:ext>
             </a:extLst>
           </p:cNvPr>
@@ -4650,145 +6351,31 @@
           <p:nvPr/>
         </p:nvPicPr>
         <p:blipFill>
-          <a:blip r:embed="rId3"/>
+          <a:blip r:embed="rId2">
+            <a:extLst>
+              <a:ext uri="{28A0092B-C50C-407E-A947-70E740481C1C}">
+                <a14:useLocalDpi xmlns:a14="http://schemas.microsoft.com/office/drawing/2010/main" val="0"/>
+              </a:ext>
+            </a:extLst>
+          </a:blip>
           <a:stretch>
             <a:fillRect/>
           </a:stretch>
         </p:blipFill>
         <p:spPr>
           <a:xfrm>
-            <a:off x="6852797" y="4029954"/>
-            <a:ext cx="2200275" cy="514350"/>
+            <a:off x="6476279" y="2388332"/>
+            <a:ext cx="4877521" cy="2254006"/>
           </a:xfrm>
           <a:prstGeom prst="rect">
             <a:avLst/>
           </a:prstGeom>
         </p:spPr>
       </p:pic>
-      <p:pic>
-        <p:nvPicPr>
-          <p:cNvPr id="6" name="Picture 5">
-            <a:extLst>
-              <a:ext uri="{FF2B5EF4-FFF2-40B4-BE49-F238E27FC236}">
-                <a16:creationId xmlns:a16="http://schemas.microsoft.com/office/drawing/2014/main" id="{E6A9D2CD-3006-4A70-B159-8257C886BA63}"/>
-              </a:ext>
-            </a:extLst>
-          </p:cNvPr>
-          <p:cNvPicPr>
-            <a:picLocks noChangeAspect="1"/>
-          </p:cNvPicPr>
-          <p:nvPr/>
-        </p:nvPicPr>
-        <p:blipFill>
-          <a:blip r:embed="rId4"/>
-          <a:stretch>
-            <a:fillRect/>
-          </a:stretch>
-        </p:blipFill>
-        <p:spPr>
-          <a:xfrm>
-            <a:off x="3122807" y="4029954"/>
-            <a:ext cx="1247775" cy="514350"/>
-          </a:xfrm>
-          <a:prstGeom prst="rect">
-            <a:avLst/>
-          </a:prstGeom>
-        </p:spPr>
-      </p:pic>
-      <p:sp>
-        <p:nvSpPr>
-          <p:cNvPr id="7" name="TextBox 6">
-            <a:extLst>
-              <a:ext uri="{FF2B5EF4-FFF2-40B4-BE49-F238E27FC236}">
-                <a16:creationId xmlns:a16="http://schemas.microsoft.com/office/drawing/2014/main" id="{946EBF1E-49A4-4994-B5B3-2CD26D9E8D78}"/>
-              </a:ext>
-            </a:extLst>
-          </p:cNvPr>
-          <p:cNvSpPr txBox="1"/>
-          <p:nvPr/>
-        </p:nvSpPr>
-        <p:spPr>
-          <a:xfrm>
-            <a:off x="4648052" y="4102463"/>
-            <a:ext cx="1927274" cy="369332"/>
-          </a:xfrm>
-          <a:prstGeom prst="rect">
-            <a:avLst/>
-          </a:prstGeom>
-          <a:noFill/>
-        </p:spPr>
-        <p:txBody>
-          <a:bodyPr wrap="square" rtlCol="0">
-            <a:spAutoFit/>
-          </a:bodyPr>
-          <a:lstStyle/>
-          <a:p>
-            <a:pPr algn="ctr"/>
-            <a:r>
-              <a:rPr lang="fr-FR"/>
-              <a:t> =&gt;</a:t>
-            </a:r>
-          </a:p>
-        </p:txBody>
-      </p:sp>
-      <p:sp>
-        <p:nvSpPr>
-          <p:cNvPr id="8" name="TextBox 7">
-            <a:extLst>
-              <a:ext uri="{FF2B5EF4-FFF2-40B4-BE49-F238E27FC236}">
-                <a16:creationId xmlns:a16="http://schemas.microsoft.com/office/drawing/2014/main" id="{B974323F-752A-4661-A4A2-28504887C493}"/>
-              </a:ext>
-            </a:extLst>
-          </p:cNvPr>
-          <p:cNvSpPr txBox="1"/>
-          <p:nvPr/>
-        </p:nvSpPr>
-        <p:spPr>
-          <a:xfrm>
-            <a:off x="1249680" y="5133328"/>
-            <a:ext cx="9692640" cy="646331"/>
-          </a:xfrm>
-          <a:prstGeom prst="rect">
-            <a:avLst/>
-          </a:prstGeom>
-          <a:noFill/>
-        </p:spPr>
-        <p:txBody>
-          <a:bodyPr wrap="square" rtlCol="0">
-            <a:spAutoFit/>
-          </a:bodyPr>
-          <a:lstStyle/>
-          <a:p>
-            <a:r>
-              <a:rPr lang="fr-FR" dirty="0"/>
-              <a:t>Si “bon” page </a:t>
-            </a:r>
-            <a:r>
-              <a:rPr lang="fr-FR" dirty="0" err="1"/>
-              <a:t>refresh</a:t>
-            </a:r>
-            <a:endParaRPr lang="fr-FR" dirty="0"/>
-          </a:p>
-          <a:p>
-            <a:r>
-              <a:rPr lang="fr-FR" dirty="0"/>
-              <a:t>Si </a:t>
-            </a:r>
-            <a:r>
-              <a:rPr lang="fr-FR"/>
-              <a:t>non le </a:t>
-            </a:r>
-            <a:r>
-              <a:rPr lang="fr-FR" dirty="0"/>
-              <a:t>bouton Incorrect déclenche une autre formulaire</a:t>
-            </a:r>
-          </a:p>
-        </p:txBody>
-      </p:sp>
     </p:spTree>
     <p:extLst>
       <p:ext uri="{BB962C8B-B14F-4D97-AF65-F5344CB8AC3E}">
-        <p14:creationId xmlns:p14="http://schemas.microsoft.com/office/powerpoint/2010/main" val="665270288"/>
+        <p14:creationId xmlns:p14="http://schemas.microsoft.com/office/powerpoint/2010/main" val="3659057012"/>
       </p:ext>
     </p:extLst>
   </p:cSld>
@@ -4820,7 +6407,7 @@
           <p:cNvPr id="2" name="Title 1">
             <a:extLst>
               <a:ext uri="{FF2B5EF4-FFF2-40B4-BE49-F238E27FC236}">
-                <a16:creationId xmlns:a16="http://schemas.microsoft.com/office/drawing/2014/main" id="{E6C2C107-3595-4F52-8FE8-2AFDB70D7BFE}"/>
+                <a16:creationId xmlns:a16="http://schemas.microsoft.com/office/drawing/2014/main" id="{A176E8B9-32B7-46B0-AF71-1CBE7A2FB291}"/>
               </a:ext>
             </a:extLst>
           </p:cNvPr>
@@ -4837,29 +6424,13 @@
           <a:lstStyle/>
           <a:p>
             <a:pPr algn="ctr"/>
-            <a:r>
-              <a:rPr lang="fr-FR" dirty="0">
-                <a:solidFill>
-                  <a:srgbClr val="FF0000"/>
-                </a:solidFill>
-              </a:rPr>
-              <a:t>Formulaire</a:t>
-            </a:r>
             <a:r>
               <a:rPr lang="en-US" dirty="0">
                 <a:solidFill>
                   <a:srgbClr val="FF0000"/>
                 </a:solidFill>
               </a:rPr>
-              <a:t>  de correction par </a:t>
-            </a:r>
-            <a:r>
-              <a:rPr lang="en-US" dirty="0" err="1">
-                <a:solidFill>
-                  <a:srgbClr val="FF0000"/>
-                </a:solidFill>
-              </a:rPr>
-              <a:t>utilisateur</a:t>
+              <a:t>TABLE CASES</a:t>
             </a:r>
             <a:endParaRPr lang="fr-FR" dirty="0">
               <a:solidFill>
@@ -4871,10 +6442,10 @@
       </p:sp>
       <p:pic>
         <p:nvPicPr>
-          <p:cNvPr id="4" name="Content Placeholder 3">
-            <a:extLst>
-              <a:ext uri="{FF2B5EF4-FFF2-40B4-BE49-F238E27FC236}">
-                <a16:creationId xmlns:a16="http://schemas.microsoft.com/office/drawing/2014/main" id="{6472A179-AD4A-45B7-BE64-3DA15BCFEB0F}"/>
+          <p:cNvPr id="7" name="Content Placeholder 6">
+            <a:extLst>
+              <a:ext uri="{FF2B5EF4-FFF2-40B4-BE49-F238E27FC236}">
+                <a16:creationId xmlns:a16="http://schemas.microsoft.com/office/drawing/2014/main" id="{25026BD0-00B5-44FD-BF06-24A9BBBDD409}"/>
               </a:ext>
             </a:extLst>
           </p:cNvPr>
@@ -4882,7 +6453,7 @@
             <a:picLocks noGrp="1" noChangeAspect="1"/>
           </p:cNvPicPr>
           <p:nvPr>
-            <p:ph idx="1"/>
+            <p:ph sz="half" idx="1"/>
           </p:nvPr>
         </p:nvPicPr>
         <p:blipFill>
@@ -4893,8 +6464,8 @@
         </p:blipFill>
         <p:spPr>
           <a:xfrm>
-            <a:off x="838200" y="2229351"/>
-            <a:ext cx="10172700" cy="533400"/>
+            <a:off x="8363245" y="1726645"/>
+            <a:ext cx="1407955" cy="2453035"/>
           </a:xfrm>
           <a:prstGeom prst="rect">
             <a:avLst/>
@@ -4903,10 +6474,123 @@
       </p:pic>
       <p:sp>
         <p:nvSpPr>
-          <p:cNvPr id="5" name="TextBox 4">
-            <a:extLst>
-              <a:ext uri="{FF2B5EF4-FFF2-40B4-BE49-F238E27FC236}">
-                <a16:creationId xmlns:a16="http://schemas.microsoft.com/office/drawing/2014/main" id="{C25CFF29-C879-4046-8C37-D4BE1AAAD2FF}"/>
+          <p:cNvPr id="5" name="Content Placeholder 4">
+            <a:extLst>
+              <a:ext uri="{FF2B5EF4-FFF2-40B4-BE49-F238E27FC236}">
+                <a16:creationId xmlns:a16="http://schemas.microsoft.com/office/drawing/2014/main" id="{3D8D1B16-F9D6-4AC7-8562-580BAD1C7405}"/>
+              </a:ext>
+            </a:extLst>
+          </p:cNvPr>
+          <p:cNvSpPr>
+            <a:spLocks noGrp="1"/>
+          </p:cNvSpPr>
+          <p:nvPr>
+            <p:ph sz="half" idx="2"/>
+          </p:nvPr>
+        </p:nvSpPr>
+        <p:spPr>
+          <a:xfrm>
+            <a:off x="914400" y="1471851"/>
+            <a:ext cx="5181600" cy="4351338"/>
+          </a:xfrm>
+        </p:spPr>
+        <p:txBody>
+          <a:bodyPr/>
+          <a:lstStyle/>
+          <a:p>
+            <a:r>
+              <a:rPr lang="en-US" dirty="0"/>
+              <a:t>Table </a:t>
+            </a:r>
+            <a:r>
+              <a:rPr lang="en-US" dirty="0" err="1"/>
+              <a:t>principale</a:t>
+            </a:r>
+            <a:endParaRPr lang="en-US" dirty="0"/>
+          </a:p>
+          <a:p>
+            <a:r>
+              <a:rPr lang="en-US" dirty="0"/>
+              <a:t>Status: True, False, “</a:t>
+            </a:r>
+            <a:r>
+              <a:rPr lang="en-US" dirty="0" err="1"/>
+              <a:t>En</a:t>
+            </a:r>
+            <a:r>
+              <a:rPr lang="en-US" dirty="0"/>
+              <a:t> </a:t>
+            </a:r>
+            <a:r>
+              <a:rPr lang="fr-FR" dirty="0"/>
+              <a:t>attente</a:t>
+            </a:r>
+            <a:r>
+              <a:rPr lang="en-US" dirty="0"/>
+              <a:t>”</a:t>
+            </a:r>
+          </a:p>
+          <a:p>
+            <a:r>
+              <a:rPr lang="en-US" dirty="0"/>
+              <a:t> </a:t>
+            </a:r>
+            <a:r>
+              <a:rPr lang="en-US" dirty="0" err="1"/>
+              <a:t>Francais</a:t>
+            </a:r>
+            <a:r>
+              <a:rPr lang="en-US" dirty="0"/>
+              <a:t> et </a:t>
+            </a:r>
+            <a:r>
+              <a:rPr lang="en-US" dirty="0" err="1"/>
+              <a:t>Anglais</a:t>
+            </a:r>
+            <a:r>
+              <a:rPr lang="en-US" dirty="0"/>
+              <a:t>.</a:t>
+            </a:r>
+            <a:endParaRPr lang="fr-FR" dirty="0"/>
+          </a:p>
+        </p:txBody>
+      </p:sp>
+      <p:pic>
+        <p:nvPicPr>
+          <p:cNvPr id="3" name="Picture 2">
+            <a:extLst>
+              <a:ext uri="{FF2B5EF4-FFF2-40B4-BE49-F238E27FC236}">
+                <a16:creationId xmlns:a16="http://schemas.microsoft.com/office/drawing/2014/main" id="{E49E44FC-564F-4128-8437-BB21B750E0E3}"/>
+              </a:ext>
+            </a:extLst>
+          </p:cNvPr>
+          <p:cNvPicPr>
+            <a:picLocks noChangeAspect="1"/>
+          </p:cNvPicPr>
+          <p:nvPr/>
+        </p:nvPicPr>
+        <p:blipFill>
+          <a:blip r:embed="rId3"/>
+          <a:stretch>
+            <a:fillRect/>
+          </a:stretch>
+        </p:blipFill>
+        <p:spPr>
+          <a:xfrm>
+            <a:off x="1922600" y="5109986"/>
+            <a:ext cx="7848600" cy="333375"/>
+          </a:xfrm>
+          <a:prstGeom prst="rect">
+            <a:avLst/>
+          </a:prstGeom>
+        </p:spPr>
+      </p:pic>
+      <p:sp>
+        <p:nvSpPr>
+          <p:cNvPr id="4" name="TextBox 3">
+            <a:extLst>
+              <a:ext uri="{FF2B5EF4-FFF2-40B4-BE49-F238E27FC236}">
+                <a16:creationId xmlns:a16="http://schemas.microsoft.com/office/drawing/2014/main" id="{CE9051DF-5DE9-4FE2-9B8F-9AE9B8CF0D97}"/>
               </a:ext>
             </a:extLst>
           </p:cNvPr>
@@ -4915,8 +6599,8 @@
         </p:nvSpPr>
         <p:spPr>
           <a:xfrm>
-            <a:off x="838200" y="3938953"/>
-            <a:ext cx="10172700" cy="646331"/>
+            <a:off x="731520" y="5074029"/>
+            <a:ext cx="4065563" cy="369332"/>
           </a:xfrm>
           <a:prstGeom prst="rect">
             <a:avLst/>
@@ -4930,99 +6614,21 @@
           <a:lstStyle/>
           <a:p>
             <a:r>
-              <a:rPr lang="fr-FR" dirty="0"/>
-              <a:t>Utilisateur</a:t>
+              <a:rPr lang="en-US" dirty="0" err="1"/>
+              <a:t>Exemple</a:t>
             </a:r>
             <a:r>
               <a:rPr lang="en-US" dirty="0"/>
-              <a:t> </a:t>
-            </a:r>
-            <a:r>
-              <a:rPr lang="en-US" dirty="0" err="1"/>
-              <a:t>peut</a:t>
-            </a:r>
-            <a:r>
-              <a:rPr lang="en-US" dirty="0"/>
-              <a:t> proposer </a:t>
-            </a:r>
-            <a:r>
-              <a:rPr lang="en-US" dirty="0" err="1"/>
-              <a:t>sa</a:t>
-            </a:r>
-            <a:r>
-              <a:rPr lang="en-US" dirty="0"/>
-              <a:t> </a:t>
-            </a:r>
-            <a:r>
-              <a:rPr lang="en-US" dirty="0" err="1"/>
-              <a:t>propre</a:t>
-            </a:r>
-            <a:r>
-              <a:rPr lang="en-US" dirty="0"/>
-              <a:t> correction</a:t>
-            </a:r>
-            <a:r>
-              <a:rPr lang="fr-FR" dirty="0"/>
-              <a:t>.</a:t>
-            </a:r>
-            <a:endParaRPr lang="en-US" dirty="0"/>
-          </a:p>
-          <a:p>
-            <a:r>
-              <a:rPr lang="en-US" dirty="0" err="1"/>
-              <a:t>Cette</a:t>
-            </a:r>
-            <a:r>
-              <a:rPr lang="en-US" dirty="0"/>
-              <a:t> nouvelle correction + Le </a:t>
-            </a:r>
-            <a:r>
-              <a:rPr lang="en-US" dirty="0" err="1"/>
-              <a:t>probleme</a:t>
-            </a:r>
-            <a:r>
-              <a:rPr lang="en-US" dirty="0"/>
-              <a:t> sera </a:t>
-            </a:r>
-            <a:r>
-              <a:rPr lang="fr-FR" dirty="0" err="1"/>
-              <a:t>stockee</a:t>
-            </a:r>
-            <a:r>
-              <a:rPr lang="en-US" dirty="0"/>
-              <a:t> </a:t>
-            </a:r>
-            <a:r>
-              <a:rPr lang="en-US" dirty="0" err="1"/>
-              <a:t>dans</a:t>
-            </a:r>
-            <a:r>
-              <a:rPr lang="en-US" dirty="0"/>
-              <a:t> la base de </a:t>
-            </a:r>
-            <a:r>
-              <a:rPr lang="fr-FR" dirty="0"/>
-              <a:t>données</a:t>
-            </a:r>
-            <a:r>
-              <a:rPr lang="en-US" dirty="0"/>
-              <a:t>. </a:t>
-            </a:r>
-            <a:r>
-              <a:rPr lang="en-US" dirty="0" err="1"/>
-              <a:t>Dans</a:t>
-            </a:r>
-            <a:r>
-              <a:rPr lang="en-US" dirty="0"/>
-              <a:t> quelle stable?</a:t>
-            </a:r>
+              <a:t>:</a:t>
+            </a:r>
+            <a:endParaRPr lang="fr-FR" dirty="0"/>
           </a:p>
         </p:txBody>
       </p:sp>
     </p:spTree>
     <p:extLst>
       <p:ext uri="{BB962C8B-B14F-4D97-AF65-F5344CB8AC3E}">
-        <p14:creationId xmlns:p14="http://schemas.microsoft.com/office/powerpoint/2010/main" val="151076299"/>
+        <p14:creationId xmlns:p14="http://schemas.microsoft.com/office/powerpoint/2010/main" val="1625049598"/>
       </p:ext>
     </p:extLst>
   </p:cSld>
@@ -5054,7 +6660,7 @@
           <p:cNvPr id="2" name="Title 1">
             <a:extLst>
               <a:ext uri="{FF2B5EF4-FFF2-40B4-BE49-F238E27FC236}">
-                <a16:creationId xmlns:a16="http://schemas.microsoft.com/office/drawing/2014/main" id="{8CEB871E-8D26-4919-9548-B82AAD762BF8}"/>
+                <a16:creationId xmlns:a16="http://schemas.microsoft.com/office/drawing/2014/main" id="{EE413DB9-A7D8-4695-84CE-D8B925D44811}"/>
               </a:ext>
             </a:extLst>
           </p:cNvPr>
@@ -5077,22 +6683,25 @@
                   <a:srgbClr val="FF0000"/>
                 </a:solidFill>
               </a:rPr>
-              <a:t>Login Admin</a:t>
-            </a:r>
-            <a:endParaRPr lang="fr-FR" dirty="0">
-              <a:solidFill>
-                <a:srgbClr val="FF0000"/>
-              </a:solidFill>
-            </a:endParaRPr>
-          </a:p>
-        </p:txBody>
-      </p:sp>
-      <p:sp>
-        <p:nvSpPr>
-          <p:cNvPr id="3" name="Content Placeholder 2">
-            <a:extLst>
-              <a:ext uri="{FF2B5EF4-FFF2-40B4-BE49-F238E27FC236}">
-                <a16:creationId xmlns:a16="http://schemas.microsoft.com/office/drawing/2014/main" id="{722B5949-B250-4680-B5BC-99AC44E88476}"/>
+              <a:t>Interface web </a:t>
+            </a:r>
+            <a:r>
+              <a:rPr lang="fr-FR" dirty="0">
+                <a:solidFill>
+                  <a:srgbClr val="FF0000"/>
+                </a:solidFill>
+              </a:rPr>
+              <a:t>multilingue</a:t>
+            </a:r>
+          </a:p>
+        </p:txBody>
+      </p:sp>
+      <p:sp>
+        <p:nvSpPr>
+          <p:cNvPr id="4" name="Content Placeholder 3">
+            <a:extLst>
+              <a:ext uri="{FF2B5EF4-FFF2-40B4-BE49-F238E27FC236}">
+                <a16:creationId xmlns:a16="http://schemas.microsoft.com/office/drawing/2014/main" id="{30AC323A-D775-4A52-A575-825C637666B5}"/>
               </a:ext>
             </a:extLst>
           </p:cNvPr>
@@ -5105,8 +6714,8 @@
         </p:nvSpPr>
         <p:spPr>
           <a:xfrm>
-            <a:off x="838200" y="1825625"/>
-            <a:ext cx="10515600" cy="1494350"/>
+            <a:off x="838200" y="3488787"/>
+            <a:ext cx="10515600" cy="2688175"/>
           </a:xfrm>
         </p:spPr>
         <p:txBody>
@@ -5115,62 +6724,80 @@
           <a:p>
             <a:r>
               <a:rPr lang="en-US" dirty="0"/>
-              <a:t>Insertion </a:t>
-            </a:r>
-            <a:r>
-              <a:rPr lang="en-US" dirty="0" err="1"/>
-              <a:t>dans</a:t>
+              <a:t>Possible </a:t>
+            </a:r>
+            <a:r>
+              <a:rPr lang="fr-FR" dirty="0"/>
+              <a:t>amélioration</a:t>
             </a:r>
             <a:r>
               <a:rPr lang="en-US" dirty="0"/>
-              <a:t> la base des </a:t>
-            </a:r>
-            <a:r>
-              <a:rPr lang="en-US" dirty="0" err="1"/>
-              <a:t>cas</a:t>
+              <a:t>.</a:t>
+            </a:r>
+          </a:p>
+          <a:p>
+            <a:r>
+              <a:rPr lang="fr-FR" dirty="0"/>
+              <a:t>Actualisation</a:t>
             </a:r>
             <a:r>
               <a:rPr lang="en-US" dirty="0"/>
-              <a:t> des </a:t>
-            </a:r>
-            <a:r>
-              <a:rPr lang="en-US" dirty="0" err="1"/>
-              <a:t>fichier</a:t>
+              <a:t> </a:t>
+            </a:r>
+            <a:r>
+              <a:rPr lang="fr-FR" dirty="0"/>
+              <a:t>dynamique</a:t>
             </a:r>
             <a:r>
               <a:rPr lang="en-US" dirty="0"/>
-              <a:t> csv</a:t>
+              <a:t>.</a:t>
             </a:r>
           </a:p>
           <a:p>
             <a:r>
               <a:rPr lang="en-US" dirty="0"/>
-              <a:t>Droit: </a:t>
-            </a:r>
-            <a:r>
-              <a:rPr lang="en-US" dirty="0" err="1"/>
-              <a:t>validee</a:t>
-            </a:r>
-            <a:r>
-              <a:rPr lang="en-US" dirty="0"/>
-              <a:t> les </a:t>
-            </a:r>
-            <a:r>
-              <a:rPr lang="en-US" dirty="0" err="1"/>
-              <a:t>problemes</a:t>
-            </a:r>
-            <a:r>
-              <a:rPr lang="en-US" dirty="0"/>
-              <a:t> + les solutions proposes par les users</a:t>
-            </a:r>
+              <a:t>PHP, JavaScript, Bootstrap.</a:t>
+            </a:r>
+          </a:p>
+          <a:p>
             <a:endParaRPr lang="fr-FR" dirty="0"/>
           </a:p>
         </p:txBody>
       </p:sp>
+      <p:pic>
+        <p:nvPicPr>
+          <p:cNvPr id="5" name="Picture 4">
+            <a:extLst>
+              <a:ext uri="{FF2B5EF4-FFF2-40B4-BE49-F238E27FC236}">
+                <a16:creationId xmlns:a16="http://schemas.microsoft.com/office/drawing/2014/main" id="{6C478FED-8C36-453A-A01F-0E26C21638C5}"/>
+              </a:ext>
+            </a:extLst>
+          </p:cNvPr>
+          <p:cNvPicPr>
+            <a:picLocks noChangeAspect="1"/>
+          </p:cNvPicPr>
+          <p:nvPr/>
+        </p:nvPicPr>
+        <p:blipFill>
+          <a:blip r:embed="rId2"/>
+          <a:stretch>
+            <a:fillRect/>
+          </a:stretch>
+        </p:blipFill>
+        <p:spPr>
+          <a:xfrm>
+            <a:off x="3714750" y="1690688"/>
+            <a:ext cx="4762500" cy="1543050"/>
+          </a:xfrm>
+          <a:prstGeom prst="rect">
+            <a:avLst/>
+          </a:prstGeom>
+        </p:spPr>
+      </p:pic>
     </p:spTree>
     <p:extLst>
       <p:ext uri="{BB962C8B-B14F-4D97-AF65-F5344CB8AC3E}">
-        <p14:creationId xmlns:p14="http://schemas.microsoft.com/office/powerpoint/2010/main" val="2721370258"/>
+        <p14:creationId xmlns:p14="http://schemas.microsoft.com/office/powerpoint/2010/main" val="3631094681"/>
       </p:ext>
     </p:extLst>
   </p:cSld>
@@ -5202,7 +6829,7 @@
           <p:cNvPr id="2" name="Title 1">
             <a:extLst>
               <a:ext uri="{FF2B5EF4-FFF2-40B4-BE49-F238E27FC236}">
-                <a16:creationId xmlns:a16="http://schemas.microsoft.com/office/drawing/2014/main" id="{1994AC65-47C5-4398-8CBE-2E28F5525A33}"/>
+                <a16:creationId xmlns:a16="http://schemas.microsoft.com/office/drawing/2014/main" id="{C52469D6-501C-48AC-8F65-DF428263330A}"/>
               </a:ext>
             </a:extLst>
           </p:cNvPr>
@@ -5220,36 +6847,137 @@
           <a:p>
             <a:pPr algn="ctr"/>
             <a:r>
-              <a:rPr lang="en-US" dirty="0">
+              <a:rPr lang="fr-FR" dirty="0">
                 <a:solidFill>
                   <a:srgbClr val="FF0000"/>
                 </a:solidFill>
               </a:rPr>
-              <a:t>Identification Admin</a:t>
-            </a:r>
-            <a:endParaRPr lang="fr-FR" dirty="0">
-              <a:solidFill>
-                <a:srgbClr val="FF0000"/>
-              </a:solidFill>
-            </a:endParaRPr>
+              <a:t>Formulaire de vérification</a:t>
+            </a:r>
+          </a:p>
+        </p:txBody>
+      </p:sp>
+      <p:sp>
+        <p:nvSpPr>
+          <p:cNvPr id="11" name="Content Placeholder 10">
+            <a:extLst>
+              <a:ext uri="{FF2B5EF4-FFF2-40B4-BE49-F238E27FC236}">
+                <a16:creationId xmlns:a16="http://schemas.microsoft.com/office/drawing/2014/main" id="{E0BBE177-6154-4743-A11D-392724B483FB}"/>
+              </a:ext>
+            </a:extLst>
+          </p:cNvPr>
+          <p:cNvSpPr>
+            <a:spLocks noGrp="1"/>
+          </p:cNvSpPr>
+          <p:nvPr>
+            <p:ph sz="half" idx="1"/>
+          </p:nvPr>
+        </p:nvSpPr>
+        <p:spPr>
+          <a:xfrm>
+            <a:off x="749874" y="3934843"/>
+            <a:ext cx="10322938" cy="2365772"/>
+          </a:xfrm>
+        </p:spPr>
+        <p:txBody>
+          <a:bodyPr/>
+          <a:lstStyle/>
+          <a:p>
+            <a:r>
+              <a:rPr lang="en-US" dirty="0"/>
+              <a:t>Correct: </a:t>
+            </a:r>
+            <a:r>
+              <a:rPr lang="fr-FR" dirty="0"/>
+              <a:t>insérer</a:t>
+            </a:r>
+            <a:r>
+              <a:rPr lang="en-US" dirty="0"/>
+              <a:t> </a:t>
+            </a:r>
+            <a:r>
+              <a:rPr lang="en-US" dirty="0" err="1"/>
+              <a:t>dans</a:t>
+            </a:r>
+            <a:r>
+              <a:rPr lang="en-US" dirty="0"/>
+              <a:t> la base</a:t>
+            </a:r>
+          </a:p>
+          <a:p>
+            <a:r>
+              <a:rPr lang="en-US" dirty="0"/>
+              <a:t>Incorrect: </a:t>
+            </a:r>
+            <a:r>
+              <a:rPr lang="fr-FR" dirty="0"/>
+              <a:t>déclenche</a:t>
+            </a:r>
+            <a:r>
+              <a:rPr lang="en-US" dirty="0"/>
+              <a:t> </a:t>
+            </a:r>
+            <a:r>
+              <a:rPr lang="en-US" dirty="0" err="1"/>
+              <a:t>une</a:t>
+            </a:r>
+            <a:r>
+              <a:rPr lang="en-US" dirty="0"/>
+              <a:t> proposition correction.</a:t>
+            </a:r>
+            <a:endParaRPr lang="fr-FR" dirty="0"/>
+          </a:p>
+        </p:txBody>
+      </p:sp>
+      <p:sp>
+        <p:nvSpPr>
+          <p:cNvPr id="7" name="TextBox 6">
+            <a:extLst>
+              <a:ext uri="{FF2B5EF4-FFF2-40B4-BE49-F238E27FC236}">
+                <a16:creationId xmlns:a16="http://schemas.microsoft.com/office/drawing/2014/main" id="{946EBF1E-49A4-4994-B5B3-2CD26D9E8D78}"/>
+              </a:ext>
+            </a:extLst>
+          </p:cNvPr>
+          <p:cNvSpPr txBox="1"/>
+          <p:nvPr/>
+        </p:nvSpPr>
+        <p:spPr>
+          <a:xfrm>
+            <a:off x="4711357" y="3288015"/>
+            <a:ext cx="1927274" cy="369332"/>
+          </a:xfrm>
+          <a:prstGeom prst="rect">
+            <a:avLst/>
+          </a:prstGeom>
+          <a:noFill/>
+        </p:spPr>
+        <p:txBody>
+          <a:bodyPr wrap="square" rtlCol="0">
+            <a:spAutoFit/>
+          </a:bodyPr>
+          <a:lstStyle/>
+          <a:p>
+            <a:pPr algn="ctr"/>
+            <a:r>
+              <a:rPr lang="fr-FR" dirty="0"/>
+              <a:t> =&gt;</a:t>
+            </a:r>
           </a:p>
         </p:txBody>
       </p:sp>
       <p:pic>
         <p:nvPicPr>
-          <p:cNvPr id="4" name="Content Placeholder 3">
-            <a:extLst>
-              <a:ext uri="{FF2B5EF4-FFF2-40B4-BE49-F238E27FC236}">
-                <a16:creationId xmlns:a16="http://schemas.microsoft.com/office/drawing/2014/main" id="{F30FF434-0791-407C-ACFB-2584AB3A60E8}"/>
+          <p:cNvPr id="10" name="Picture 9">
+            <a:extLst>
+              <a:ext uri="{FF2B5EF4-FFF2-40B4-BE49-F238E27FC236}">
+                <a16:creationId xmlns:a16="http://schemas.microsoft.com/office/drawing/2014/main" id="{0A2728C7-5356-4538-A7AB-D02E910B6ED5}"/>
               </a:ext>
             </a:extLst>
           </p:cNvPr>
           <p:cNvPicPr>
-            <a:picLocks noGrp="1" noChangeAspect="1"/>
+            <a:picLocks noChangeAspect="1"/>
           </p:cNvPicPr>
-          <p:nvPr>
-            <p:ph idx="1"/>
-          </p:nvPr>
+          <p:nvPr/>
         </p:nvPicPr>
         <p:blipFill>
           <a:blip r:embed="rId2"/>
@@ -5259,65 +6987,78 @@
         </p:blipFill>
         <p:spPr>
           <a:xfrm>
-            <a:off x="4545988" y="1690688"/>
-            <a:ext cx="3381375" cy="2952750"/>
+            <a:off x="1119187" y="1549909"/>
+            <a:ext cx="9953625" cy="1200150"/>
           </a:xfrm>
           <a:prstGeom prst="rect">
             <a:avLst/>
           </a:prstGeom>
         </p:spPr>
       </p:pic>
-      <p:sp>
-        <p:nvSpPr>
-          <p:cNvPr id="3" name="TextBox 2">
-            <a:extLst>
-              <a:ext uri="{FF2B5EF4-FFF2-40B4-BE49-F238E27FC236}">
-                <a16:creationId xmlns:a16="http://schemas.microsoft.com/office/drawing/2014/main" id="{45F06680-4891-41B5-8376-41BB68818301}"/>
-              </a:ext>
-            </a:extLst>
-          </p:cNvPr>
-          <p:cNvSpPr txBox="1"/>
+      <p:pic>
+        <p:nvPicPr>
+          <p:cNvPr id="14" name="Picture 13">
+            <a:extLst>
+              <a:ext uri="{FF2B5EF4-FFF2-40B4-BE49-F238E27FC236}">
+                <a16:creationId xmlns:a16="http://schemas.microsoft.com/office/drawing/2014/main" id="{B6A49B13-A5C9-4DD3-9672-9A0588458A38}"/>
+              </a:ext>
+            </a:extLst>
+          </p:cNvPr>
+          <p:cNvPicPr>
+            <a:picLocks noChangeAspect="1"/>
+          </p:cNvPicPr>
           <p:nvPr/>
-        </p:nvSpPr>
+        </p:nvPicPr>
+        <p:blipFill>
+          <a:blip r:embed="rId3"/>
+          <a:stretch>
+            <a:fillRect/>
+          </a:stretch>
+        </p:blipFill>
         <p:spPr>
           <a:xfrm>
-            <a:off x="1997612" y="5359791"/>
-            <a:ext cx="5929751" cy="646331"/>
+            <a:off x="7636485" y="3288015"/>
+            <a:ext cx="2124075" cy="476250"/>
           </a:xfrm>
           <a:prstGeom prst="rect">
             <a:avLst/>
           </a:prstGeom>
-          <a:noFill/>
-        </p:spPr>
-        <p:txBody>
-          <a:bodyPr wrap="square" rtlCol="0">
-            <a:spAutoFit/>
-          </a:bodyPr>
-          <a:lstStyle/>
-          <a:p>
-            <a:r>
-              <a:rPr lang="en-US" dirty="0"/>
-              <a:t>Pop up</a:t>
-            </a:r>
-            <a:endParaRPr lang="fr-FR" dirty="0"/>
-          </a:p>
-          <a:p>
-            <a:r>
-              <a:rPr lang="en-US" dirty="0"/>
-              <a:t>I</a:t>
-            </a:r>
-            <a:r>
-              <a:rPr lang="fr-FR" dirty="0"/>
-              <a:t>l n’y a pas d’inscription. </a:t>
-            </a:r>
-            <a:endParaRPr lang="en-US" dirty="0"/>
-          </a:p>
-        </p:txBody>
-      </p:sp>
+        </p:spPr>
+      </p:pic>
+      <p:pic>
+        <p:nvPicPr>
+          <p:cNvPr id="15" name="Picture 14">
+            <a:extLst>
+              <a:ext uri="{FF2B5EF4-FFF2-40B4-BE49-F238E27FC236}">
+                <a16:creationId xmlns:a16="http://schemas.microsoft.com/office/drawing/2014/main" id="{0CCC8CA9-8EAC-4454-9EA7-1175E471B009}"/>
+              </a:ext>
+            </a:extLst>
+          </p:cNvPr>
+          <p:cNvPicPr>
+            <a:picLocks noChangeAspect="1"/>
+          </p:cNvPicPr>
+          <p:nvPr/>
+        </p:nvPicPr>
+        <p:blipFill>
+          <a:blip r:embed="rId4"/>
+          <a:stretch>
+            <a:fillRect/>
+          </a:stretch>
+        </p:blipFill>
+        <p:spPr>
+          <a:xfrm>
+            <a:off x="2665753" y="3292342"/>
+            <a:ext cx="1047750" cy="371475"/>
+          </a:xfrm>
+          <a:prstGeom prst="rect">
+            <a:avLst/>
+          </a:prstGeom>
+        </p:spPr>
+      </p:pic>
     </p:spTree>
     <p:extLst>
       <p:ext uri="{BB962C8B-B14F-4D97-AF65-F5344CB8AC3E}">
-        <p14:creationId xmlns:p14="http://schemas.microsoft.com/office/powerpoint/2010/main" val="4119237707"/>
+        <p14:creationId xmlns:p14="http://schemas.microsoft.com/office/powerpoint/2010/main" val="665270288"/>
       </p:ext>
     </p:extLst>
   </p:cSld>

</xml_diff>

<commit_message>
add soutenance + modif data
</commit_message>
<xml_diff>
--- a/RapportNam/Nouveau Microsoft PowerPoint Presentation.pptx
+++ b/RapportNam/Nouveau Microsoft PowerPoint Presentation.pptx
@@ -5,7 +5,7 @@
     <p:sldMasterId id="2147483648" r:id="rId1"/>
   </p:sldMasterIdLst>
   <p:notesMasterIdLst>
-    <p:notesMasterId r:id="rId15"/>
+    <p:notesMasterId r:id="rId17"/>
   </p:notesMasterIdLst>
   <p:sldIdLst>
     <p:sldId id="266" r:id="rId2"/>
@@ -21,6 +21,8 @@
     <p:sldId id="260" r:id="rId12"/>
     <p:sldId id="261" r:id="rId13"/>
     <p:sldId id="262" r:id="rId14"/>
+    <p:sldId id="270" r:id="rId15"/>
+    <p:sldId id="271" r:id="rId16"/>
   </p:sldIdLst>
   <p:sldSz cx="12192000" cy="6858000"/>
   <p:notesSz cx="6858000" cy="9144000"/>
@@ -4125,7 +4127,7 @@
                   <a:srgbClr val="FF0000"/>
                 </a:solidFill>
               </a:rPr>
-              <a:t>  de correction par </a:t>
+              <a:t>  de correction par l’</a:t>
             </a:r>
             <a:r>
               <a:rPr lang="fr-FR" noProof="1">
@@ -4165,13 +4167,14 @@
           <a:lstStyle/>
           <a:p>
             <a:r>
+              <a:rPr lang="en-US" dirty="0"/>
+              <a:t>“Correct” </a:t>
+            </a:r>
+            <a:r>
               <a:rPr lang="fr-FR" dirty="0"/>
-              <a:t>Désactiver</a:t>
-            </a:r>
-            <a:r>
-              <a:rPr lang="en-US" dirty="0"/>
-              <a:t> “Correct”</a:t>
-            </a:r>
+              <a:t>désactivé </a:t>
+            </a:r>
+            <a:endParaRPr lang="en-US" dirty="0"/>
           </a:p>
           <a:p>
             <a:r>
@@ -4379,13 +4382,13 @@
           <a:p>
             <a:r>
               <a:rPr lang="fr-FR" dirty="0"/>
-              <a:t>Insertion dans la base des cas des fichier csv</a:t>
+              <a:t>Insertion dans la base de cas à partir des fichiers csv</a:t>
             </a:r>
           </a:p>
           <a:p>
             <a:r>
               <a:rPr lang="fr-FR" dirty="0"/>
-              <a:t>Droit: validée les problèmes + les solutions proposées par les utilisateurs.</a:t>
+              <a:t>Validation des problèmes  et des solutions proposées par les utilisateurs.</a:t>
             </a:r>
           </a:p>
         </p:txBody>
@@ -4523,8 +4526,12 @@
           </a:p>
           <a:p>
             <a:r>
+              <a:rPr lang="fr-FR"/>
+              <a:t>Pas d’inscription </a:t>
+            </a:r>
+            <a:r>
               <a:rPr lang="fr-FR" dirty="0"/>
-              <a:t>Pas inscription disponible</a:t>
+              <a:t>disponible</a:t>
             </a:r>
           </a:p>
         </p:txBody>
@@ -4682,6 +4689,167 @@
     <p:extLst>
       <p:ext uri="{BB962C8B-B14F-4D97-AF65-F5344CB8AC3E}">
         <p14:creationId xmlns:p14="http://schemas.microsoft.com/office/powerpoint/2010/main" val="908791889"/>
+      </p:ext>
+    </p:extLst>
+  </p:cSld>
+  <p:clrMapOvr>
+    <a:masterClrMapping/>
+  </p:clrMapOvr>
+</p:sld>
+</file>
+
+<file path=ppt/slides/slide14.xml><?xml version="1.0" encoding="utf-8"?>
+<p:sld xmlns:a="http://schemas.openxmlformats.org/drawingml/2006/main" xmlns:r="http://schemas.openxmlformats.org/officeDocument/2006/relationships" xmlns:p="http://schemas.openxmlformats.org/presentationml/2006/main">
+  <p:cSld>
+    <p:spTree>
+      <p:nvGrpSpPr>
+        <p:cNvPr id="1" name=""/>
+        <p:cNvGrpSpPr/>
+        <p:nvPr/>
+      </p:nvGrpSpPr>
+      <p:grpSpPr>
+        <a:xfrm>
+          <a:off x="0" y="0"/>
+          <a:ext cx="0" cy="0"/>
+          <a:chOff x="0" y="0"/>
+          <a:chExt cx="0" cy="0"/>
+        </a:xfrm>
+      </p:grpSpPr>
+      <p:sp>
+        <p:nvSpPr>
+          <p:cNvPr id="2" name="Title 1">
+            <a:extLst>
+              <a:ext uri="{FF2B5EF4-FFF2-40B4-BE49-F238E27FC236}">
+                <a16:creationId xmlns:a16="http://schemas.microsoft.com/office/drawing/2014/main" id="{F7089F2E-BEF4-4FC3-B8EA-59CC10F9133E}"/>
+              </a:ext>
+            </a:extLst>
+          </p:cNvPr>
+          <p:cNvSpPr>
+            <a:spLocks noGrp="1"/>
+          </p:cNvSpPr>
+          <p:nvPr>
+            <p:ph type="title"/>
+          </p:nvPr>
+        </p:nvSpPr>
+        <p:spPr/>
+        <p:txBody>
+          <a:bodyPr/>
+          <a:lstStyle/>
+          <a:p>
+            <a:pPr algn="ctr"/>
+            <a:r>
+              <a:rPr lang="fr-FR" dirty="0">
+                <a:solidFill>
+                  <a:srgbClr val="FF0000"/>
+                </a:solidFill>
+              </a:rPr>
+              <a:t>DEMO</a:t>
+            </a:r>
+          </a:p>
+        </p:txBody>
+      </p:sp>
+      <p:sp>
+        <p:nvSpPr>
+          <p:cNvPr id="3" name="Content Placeholder 2">
+            <a:extLst>
+              <a:ext uri="{FF2B5EF4-FFF2-40B4-BE49-F238E27FC236}">
+                <a16:creationId xmlns:a16="http://schemas.microsoft.com/office/drawing/2014/main" id="{3ED0531C-C6C6-4D5D-8047-0173B2296BCA}"/>
+              </a:ext>
+            </a:extLst>
+          </p:cNvPr>
+          <p:cNvSpPr>
+            <a:spLocks noGrp="1"/>
+          </p:cNvSpPr>
+          <p:nvPr>
+            <p:ph sz="half" idx="1"/>
+          </p:nvPr>
+        </p:nvSpPr>
+        <p:spPr>
+          <a:xfrm>
+            <a:off x="838200" y="1825625"/>
+            <a:ext cx="10515600" cy="4351338"/>
+          </a:xfrm>
+        </p:spPr>
+        <p:txBody>
+          <a:bodyPr/>
+          <a:lstStyle/>
+          <a:p>
+            <a:endParaRPr lang="fr-FR" dirty="0"/>
+          </a:p>
+        </p:txBody>
+      </p:sp>
+    </p:spTree>
+    <p:extLst>
+      <p:ext uri="{BB962C8B-B14F-4D97-AF65-F5344CB8AC3E}">
+        <p14:creationId xmlns:p14="http://schemas.microsoft.com/office/powerpoint/2010/main" val="762069452"/>
+      </p:ext>
+    </p:extLst>
+  </p:cSld>
+  <p:clrMapOvr>
+    <a:masterClrMapping/>
+  </p:clrMapOvr>
+</p:sld>
+</file>
+
+<file path=ppt/slides/slide15.xml><?xml version="1.0" encoding="utf-8"?>
+<p:sld xmlns:a="http://schemas.openxmlformats.org/drawingml/2006/main" xmlns:r="http://schemas.openxmlformats.org/officeDocument/2006/relationships" xmlns:p="http://schemas.openxmlformats.org/presentationml/2006/main">
+  <p:cSld>
+    <p:spTree>
+      <p:nvGrpSpPr>
+        <p:cNvPr id="1" name=""/>
+        <p:cNvGrpSpPr/>
+        <p:nvPr/>
+      </p:nvGrpSpPr>
+      <p:grpSpPr>
+        <a:xfrm>
+          <a:off x="0" y="0"/>
+          <a:ext cx="0" cy="0"/>
+          <a:chOff x="0" y="0"/>
+          <a:chExt cx="0" cy="0"/>
+        </a:xfrm>
+      </p:grpSpPr>
+      <p:sp>
+        <p:nvSpPr>
+          <p:cNvPr id="2" name="Title 1">
+            <a:extLst>
+              <a:ext uri="{FF2B5EF4-FFF2-40B4-BE49-F238E27FC236}">
+                <a16:creationId xmlns:a16="http://schemas.microsoft.com/office/drawing/2014/main" id="{55255D63-6F52-4C79-9DF8-2D1D0A760D49}"/>
+              </a:ext>
+            </a:extLst>
+          </p:cNvPr>
+          <p:cNvSpPr>
+            <a:spLocks noGrp="1"/>
+          </p:cNvSpPr>
+          <p:nvPr>
+            <p:ph type="title"/>
+          </p:nvPr>
+        </p:nvSpPr>
+        <p:spPr>
+          <a:xfrm>
+            <a:off x="627185" y="2447143"/>
+            <a:ext cx="10515600" cy="1325563"/>
+          </a:xfrm>
+        </p:spPr>
+        <p:txBody>
+          <a:bodyPr/>
+          <a:lstStyle/>
+          <a:p>
+            <a:pPr algn="ctr"/>
+            <a:r>
+              <a:rPr lang="fr-FR" dirty="0">
+                <a:solidFill>
+                  <a:srgbClr val="FF0000"/>
+                </a:solidFill>
+              </a:rPr>
+              <a:t>MERCI</a:t>
+            </a:r>
+          </a:p>
+        </p:txBody>
+      </p:sp>
+    </p:spTree>
+    <p:extLst>
+      <p:ext uri="{BB962C8B-B14F-4D97-AF65-F5344CB8AC3E}">
+        <p14:creationId xmlns:p14="http://schemas.microsoft.com/office/powerpoint/2010/main" val="2025789265"/>
       </p:ext>
     </p:extLst>
   </p:cSld>
@@ -6175,7 +6343,7 @@
           <a:p>
             <a:r>
               <a:rPr lang="en-US" dirty="0"/>
-              <a:t>Interface web et Base de </a:t>
+              <a:t>Interface web et base de </a:t>
             </a:r>
             <a:r>
               <a:rPr lang="fr-FR" dirty="0"/>
@@ -6511,7 +6679,7 @@
           <a:p>
             <a:r>
               <a:rPr lang="en-US" dirty="0"/>
-              <a:t>Status: True, False, “</a:t>
+              <a:t>Status: True, False, </a:t>
             </a:r>
             <a:r>
               <a:rPr lang="en-US" dirty="0" err="1"/>
@@ -6525,10 +6693,7 @@
               <a:rPr lang="fr-FR" dirty="0"/>
               <a:t>attente</a:t>
             </a:r>
-            <a:r>
-              <a:rPr lang="en-US" dirty="0"/>
-              <a:t>”</a:t>
-            </a:r>
+            <a:endParaRPr lang="en-US" dirty="0"/>
           </a:p>
           <a:p>
             <a:r>
@@ -6536,15 +6701,15 @@
               <a:t> </a:t>
             </a:r>
             <a:r>
-              <a:rPr lang="en-US" dirty="0" err="1"/>
-              <a:t>Francais</a:t>
+              <a:rPr lang="fr-FR" dirty="0"/>
+              <a:t>Français</a:t>
             </a:r>
             <a:r>
               <a:rPr lang="en-US" dirty="0"/>
               <a:t> et </a:t>
             </a:r>
             <a:r>
-              <a:rPr lang="en-US" dirty="0" err="1"/>
+              <a:rPr lang="fr-FR" dirty="0"/>
               <a:t>Anglais</a:t>
             </a:r>
             <a:r>

</xml_diff>